<commit_message>
Committing changes for Exceptions.
</commit_message>
<xml_diff>
--- a/courseMaterial/Exceptions/Exceptions.pptx
+++ b/courseMaterial/Exceptions/Exceptions.pptx
@@ -5,10 +5,10 @@
     <p:sldMasterId id="2147483648" r:id="rId4"/>
   </p:sldMasterIdLst>
   <p:notesMasterIdLst>
-    <p:notesMasterId r:id="rId24"/>
+    <p:notesMasterId r:id="rId23"/>
   </p:notesMasterIdLst>
   <p:handoutMasterIdLst>
-    <p:handoutMasterId r:id="rId25"/>
+    <p:handoutMasterId r:id="rId24"/>
   </p:handoutMasterIdLst>
   <p:sldIdLst>
     <p:sldId id="256" r:id="rId5"/>
@@ -16,20 +16,19 @@
     <p:sldId id="282" r:id="rId7"/>
     <p:sldId id="294" r:id="rId8"/>
     <p:sldId id="295" r:id="rId9"/>
-    <p:sldId id="297" r:id="rId10"/>
-    <p:sldId id="283" r:id="rId11"/>
-    <p:sldId id="286" r:id="rId12"/>
-    <p:sldId id="284" r:id="rId13"/>
-    <p:sldId id="257" r:id="rId14"/>
-    <p:sldId id="285" r:id="rId15"/>
-    <p:sldId id="287" r:id="rId16"/>
-    <p:sldId id="288" r:id="rId17"/>
-    <p:sldId id="289" r:id="rId18"/>
-    <p:sldId id="290" r:id="rId19"/>
-    <p:sldId id="291" r:id="rId20"/>
-    <p:sldId id="293" r:id="rId21"/>
-    <p:sldId id="292" r:id="rId22"/>
-    <p:sldId id="268" r:id="rId23"/>
+    <p:sldId id="299" r:id="rId10"/>
+    <p:sldId id="300" r:id="rId11"/>
+    <p:sldId id="304" r:id="rId12"/>
+    <p:sldId id="301" r:id="rId13"/>
+    <p:sldId id="303" r:id="rId14"/>
+    <p:sldId id="283" r:id="rId15"/>
+    <p:sldId id="297" r:id="rId16"/>
+    <p:sldId id="302" r:id="rId17"/>
+    <p:sldId id="305" r:id="rId18"/>
+    <p:sldId id="306" r:id="rId19"/>
+    <p:sldId id="307" r:id="rId20"/>
+    <p:sldId id="298" r:id="rId21"/>
+    <p:sldId id="268" r:id="rId22"/>
   </p:sldIdLst>
   <p:sldSz cx="12192000" cy="6858000"/>
   <p:notesSz cx="6858000" cy="9144000"/>
@@ -233,7 +232,7 @@
           <a:p>
             <a:fld id="{68416927-5E9C-4E77-85FE-EE4C81C1DE39}" type="datetimeFigureOut">
               <a:rPr lang="en-US" smtClean="0"/>
-              <a:t>4/19/2020</a:t>
+              <a:t>4/21/2020</a:t>
             </a:fld>
             <a:endParaRPr lang="en-US" dirty="0"/>
           </a:p>
@@ -410,7 +409,7 @@
           <a:p>
             <a:fld id="{FA798B7E-6604-4F74-86DB-B30627D56244}" type="datetimeFigureOut">
               <a:rPr lang="en-US" smtClean="0"/>
-              <a:t>4/19/2020</a:t>
+              <a:t>4/21/2020</a:t>
             </a:fld>
             <a:endParaRPr lang="en-US" dirty="0"/>
           </a:p>
@@ -4725,8 +4724,8 @@
         </p:nvSpPr>
         <p:spPr>
           <a:xfrm>
-            <a:off x="838200" y="641855"/>
-            <a:ext cx="10515600" cy="772107"/>
+            <a:off x="838199" y="611079"/>
+            <a:ext cx="10515600" cy="833663"/>
           </a:xfrm>
         </p:spPr>
         <p:txBody>
@@ -4736,7 +4735,11 @@
             <a:pPr algn="ctr"/>
             <a:r>
               <a:rPr lang="en-US" dirty="0" smtClean="0"/>
-              <a:t>Polymorphism :Method Overloading</a:t>
+              <a:t>Finally </a:t>
+            </a:r>
+            <a:r>
+              <a:rPr lang="en-US" dirty="0" smtClean="0"/>
+              <a:t>Block</a:t>
             </a:r>
             <a:endParaRPr lang="en-US" dirty="0"/>
           </a:p>
@@ -4744,7 +4747,13 @@
       </p:sp>
       <p:sp>
         <p:nvSpPr>
-          <p:cNvPr id="6" name="Content Placeholder 5"/>
+          <p:cNvPr id="3" name="Content Placeholder 2">
+            <a:extLst>
+              <a:ext uri="{FF2B5EF4-FFF2-40B4-BE49-F238E27FC236}">
+                <a16:creationId xmlns:a16="http://schemas.microsoft.com/office/drawing/2014/main" id="{FA6A4B49-27C8-46B6-8B11-AD7E8F615E2C}"/>
+              </a:ext>
+            </a:extLst>
+          </p:cNvPr>
           <p:cNvSpPr>
             <a:spLocks noGrp="1"/>
           </p:cNvSpPr>
@@ -4754,8 +4763,8 @@
         </p:nvSpPr>
         <p:spPr>
           <a:xfrm>
-            <a:off x="682625" y="2010137"/>
-            <a:ext cx="10515600" cy="4351338"/>
+            <a:off x="838199" y="1825625"/>
+            <a:ext cx="10515599" cy="4351338"/>
           </a:xfrm>
         </p:spPr>
         <p:txBody>
@@ -4764,31 +4773,32 @@
           </a:bodyPr>
           <a:lstStyle/>
           <a:p>
-            <a:endParaRPr lang="en-US" sz="2400" dirty="0" smtClean="0"/>
-          </a:p>
-          <a:p>
-            <a:r>
-              <a:rPr lang="en-US" sz="2400" dirty="0" smtClean="0"/>
-              <a:t>Polymorphism form one of the pillars of Object oriented programming. Polymorphism literally means one thing having multiple forms.</a:t>
-            </a:r>
-          </a:p>
-          <a:p>
-            <a:r>
-              <a:rPr lang="en-US" sz="2400" dirty="0" smtClean="0"/>
-              <a:t>Example : Like the add functionality. Two integers can be added, two floats can be added or one integer &amp; one float could be added and many more. This shows add functionality remains the same but type values that are being added can change.</a:t>
-            </a:r>
-          </a:p>
-          <a:p>
-            <a:r>
-              <a:rPr lang="en-US" sz="2400" dirty="0" smtClean="0"/>
-              <a:t>In Java there are two types of polymorphism ,one is compile time and the other is runtime polymorphism. In this chapter we shall be limiting ourselves to compile time polymorphism.</a:t>
-            </a:r>
-          </a:p>
-          <a:p>
-            <a:endParaRPr lang="en-US" sz="2400" dirty="0" smtClean="0"/>
-          </a:p>
-          <a:p>
-            <a:endParaRPr lang="en-US" sz="2400" dirty="0" smtClean="0"/>
+            <a:endParaRPr lang="en-US" sz="2800" dirty="0" smtClean="0"/>
+          </a:p>
+          <a:p>
+            <a:r>
+              <a:rPr lang="en-US" sz="2800" dirty="0" smtClean="0"/>
+              <a:t>A finally block is sure piece of code. This means that whether and exception occurs or not , the code in finally block is guaranteed to be executed.</a:t>
+            </a:r>
+          </a:p>
+          <a:p>
+            <a:r>
+              <a:rPr lang="en-US" sz="2800" dirty="0" smtClean="0"/>
+              <a:t>This is  a common place to close any open database connection or file streams or other common tasks like setting objects to null, </a:t>
+            </a:r>
+            <a:r>
+              <a:rPr lang="en-US" sz="2800" dirty="0" err="1" smtClean="0"/>
+              <a:t>rsetting</a:t>
+            </a:r>
+            <a:r>
+              <a:rPr lang="en-US" sz="2800" dirty="0" smtClean="0"/>
+              <a:t> any value etc. </a:t>
+            </a:r>
+            <a:r>
+              <a:rPr lang="en-US" sz="2800" dirty="0" smtClean="0"/>
+              <a:t>This block ideally contains code that is used for cleaning up affairs.</a:t>
+            </a:r>
+            <a:endParaRPr lang="en-US" sz="2800" dirty="0" smtClean="0"/>
           </a:p>
         </p:txBody>
       </p:sp>
@@ -4808,7 +4818,12 @@
             <p:ph type="sldNum" sz="quarter" idx="10"/>
           </p:nvPr>
         </p:nvSpPr>
-        <p:spPr/>
+        <p:spPr>
+          <a:xfrm>
+            <a:off x="11353800" y="6361475"/>
+            <a:ext cx="838200" cy="360000"/>
+          </a:xfrm>
+        </p:spPr>
         <p:txBody>
           <a:bodyPr/>
           <a:lstStyle/>
@@ -4834,7 +4849,7 @@
                 <a16:creationId xmlns:a16="http://schemas.microsoft.com/office/drawing/2014/main" id="{5F253864-26FA-4AB1-9F0A-4F57D870EE85}"/>
               </a:ext>
               <a:ext uri="{C183D7F6-B498-43B3-948B-1728B52AA6E4}">
-                <adec:decorative xmlns="" xmlns:adec="http://schemas.microsoft.com/office/drawing/2017/decorative" val="1"/>
+                <adec:decorative xmlns:adec="http://schemas.microsoft.com/office/drawing/2017/decorative" xmlns="" val="1"/>
               </a:ext>
             </a:extLst>
           </p:cNvPr>
@@ -4887,7 +4902,7 @@
     </p:spTree>
     <p:extLst>
       <p:ext uri="{BB962C8B-B14F-4D97-AF65-F5344CB8AC3E}">
-        <p14:creationId xmlns:p14="http://schemas.microsoft.com/office/powerpoint/2010/main" val="1287735390"/>
+        <p14:creationId xmlns:p14="http://schemas.microsoft.com/office/powerpoint/2010/main" val="2146720335"/>
       </p:ext>
     </p:extLst>
   </p:cSld>
@@ -4939,8 +4954,8 @@
         </p:nvSpPr>
         <p:spPr>
           <a:xfrm>
-            <a:off x="838200" y="641855"/>
-            <a:ext cx="10515600" cy="772107"/>
+            <a:off x="838199" y="611079"/>
+            <a:ext cx="10515600" cy="833663"/>
           </a:xfrm>
         </p:spPr>
         <p:txBody>
@@ -4949,70 +4964,10 @@
           <a:p>
             <a:pPr algn="ctr"/>
             <a:r>
-              <a:rPr lang="en-US" dirty="0"/>
-              <a:t>Polymorphism :Method Overloading</a:t>
-            </a:r>
-          </a:p>
-        </p:txBody>
-      </p:sp>
-      <p:sp>
-        <p:nvSpPr>
-          <p:cNvPr id="6" name="Content Placeholder 5"/>
-          <p:cNvSpPr>
-            <a:spLocks noGrp="1"/>
-          </p:cNvSpPr>
-          <p:nvPr>
-            <p:ph idx="1"/>
-          </p:nvPr>
-        </p:nvSpPr>
-        <p:spPr>
-          <a:xfrm>
-            <a:off x="682625" y="2010137"/>
-            <a:ext cx="10515600" cy="4351338"/>
-          </a:xfrm>
-        </p:spPr>
-        <p:txBody>
-          <a:bodyPr>
-            <a:normAutofit/>
-          </a:bodyPr>
-          <a:lstStyle/>
-          <a:p>
-            <a:r>
-              <a:rPr lang="en-US" sz="2400" dirty="0" smtClean="0"/>
-              <a:t>Signature of a method is the name of the method plus the arguments listed in its declaration.</a:t>
-            </a:r>
-          </a:p>
-          <a:p>
-            <a:r>
-              <a:rPr lang="en-US" sz="2400" dirty="0" smtClean="0"/>
-              <a:t>Compile time polymorphism is achieved through method overloading.</a:t>
-            </a:r>
-          </a:p>
-          <a:p>
-            <a:r>
-              <a:rPr lang="en-US" sz="2400" dirty="0" smtClean="0"/>
-              <a:t>Through method overloading , many methods  can be defined with same name and different parameters.</a:t>
-            </a:r>
-          </a:p>
-          <a:p>
-            <a:r>
-              <a:rPr lang="en-US" sz="2400" dirty="0" smtClean="0"/>
-              <a:t>Return type does not form the part of method signature, hence if two methods have the same method name &amp; parameters but different return types that is not the case of method overloading. In this case compiler would raise an error saying duplicate method exists.</a:t>
-            </a:r>
-          </a:p>
-          <a:p>
-            <a:r>
-              <a:rPr lang="en-US" sz="2400" dirty="0" smtClean="0"/>
-              <a:t>Examples : Add(Integer) </a:t>
-            </a:r>
-            <a:r>
-              <a:rPr lang="en-US" sz="2400" dirty="0"/>
-              <a:t>,</a:t>
-            </a:r>
-            <a:r>
-              <a:rPr lang="en-US" sz="2400" dirty="0" smtClean="0"/>
-              <a:t> Add(Float) , Add(Short)</a:t>
-            </a:r>
+              <a:rPr lang="en-US" dirty="0" smtClean="0"/>
+              <a:t>Try-Catch-Finally mechanism</a:t>
+            </a:r>
+            <a:endParaRPr lang="en-US" dirty="0"/>
           </a:p>
         </p:txBody>
       </p:sp>
@@ -5032,7 +4987,12 @@
             <p:ph type="sldNum" sz="quarter" idx="10"/>
           </p:nvPr>
         </p:nvSpPr>
-        <p:spPr/>
+        <p:spPr>
+          <a:xfrm>
+            <a:off x="11353800" y="6361475"/>
+            <a:ext cx="838200" cy="360000"/>
+          </a:xfrm>
+        </p:spPr>
         <p:txBody>
           <a:bodyPr/>
           <a:lstStyle/>
@@ -5058,7 +5018,7 @@
                 <a16:creationId xmlns:a16="http://schemas.microsoft.com/office/drawing/2014/main" id="{5F253864-26FA-4AB1-9F0A-4F57D870EE85}"/>
               </a:ext>
               <a:ext uri="{C183D7F6-B498-43B3-948B-1728B52AA6E4}">
-                <adec:decorative xmlns="" xmlns:adec="http://schemas.microsoft.com/office/drawing/2017/decorative" val="1"/>
+                <adec:decorative xmlns:adec="http://schemas.microsoft.com/office/drawing/2017/decorative" xmlns="" val="1"/>
               </a:ext>
             </a:extLst>
           </p:cNvPr>
@@ -5108,10 +5068,39 @@
           </a:p>
         </p:txBody>
       </p:sp>
+      <p:pic>
+        <p:nvPicPr>
+          <p:cNvPr id="8" name="Content Placeholder 7"/>
+          <p:cNvPicPr>
+            <a:picLocks noGrp="1" noChangeAspect="1"/>
+          </p:cNvPicPr>
+          <p:nvPr>
+            <p:ph idx="1"/>
+          </p:nvPr>
+        </p:nvPicPr>
+        <p:blipFill>
+          <a:blip r:embed="rId2">
+            <a:extLst>
+              <a:ext uri="{28A0092B-C50C-407E-A947-70E740481C1C}">
+                <a14:useLocalDpi xmlns:a14="http://schemas.microsoft.com/office/drawing/2010/main" val="0"/>
+              </a:ext>
+            </a:extLst>
+          </a:blip>
+          <a:stretch>
+            <a:fillRect/>
+          </a:stretch>
+        </p:blipFill>
+        <p:spPr>
+          <a:xfrm>
+            <a:off x="2298248" y="1827704"/>
+            <a:ext cx="6596371" cy="4351338"/>
+          </a:xfrm>
+        </p:spPr>
+      </p:pic>
     </p:spTree>
     <p:extLst>
       <p:ext uri="{BB962C8B-B14F-4D97-AF65-F5344CB8AC3E}">
-        <p14:creationId xmlns:p14="http://schemas.microsoft.com/office/powerpoint/2010/main" val="1023982374"/>
+        <p14:creationId xmlns:p14="http://schemas.microsoft.com/office/powerpoint/2010/main" val="2745771103"/>
       </p:ext>
     </p:extLst>
   </p:cSld>
@@ -5163,8 +5152,8 @@
         </p:nvSpPr>
         <p:spPr>
           <a:xfrm>
-            <a:off x="838200" y="641855"/>
-            <a:ext cx="10515600" cy="772107"/>
+            <a:off x="838199" y="611079"/>
+            <a:ext cx="10515600" cy="833663"/>
           </a:xfrm>
         </p:spPr>
         <p:txBody>
@@ -5173,8 +5162,8 @@
           <a:p>
             <a:pPr algn="ctr"/>
             <a:r>
-              <a:rPr lang="en-US" dirty="0" smtClean="0"/>
-              <a:t>Polymorphism: Method Selection</a:t>
+              <a:rPr lang="en-US" dirty="0"/>
+              <a:t>Checked &amp; Unchecked Exceptions</a:t>
             </a:r>
             <a:endParaRPr lang="en-US" dirty="0"/>
           </a:p>
@@ -5182,7 +5171,13 @@
       </p:sp>
       <p:sp>
         <p:nvSpPr>
-          <p:cNvPr id="6" name="Content Placeholder 5"/>
+          <p:cNvPr id="3" name="Content Placeholder 2">
+            <a:extLst>
+              <a:ext uri="{FF2B5EF4-FFF2-40B4-BE49-F238E27FC236}">
+                <a16:creationId xmlns:a16="http://schemas.microsoft.com/office/drawing/2014/main" id="{FA6A4B49-27C8-46B6-8B11-AD7E8F615E2C}"/>
+              </a:ext>
+            </a:extLst>
+          </p:cNvPr>
           <p:cNvSpPr>
             <a:spLocks noGrp="1"/>
           </p:cNvSpPr>
@@ -5192,154 +5187,87 @@
         </p:nvSpPr>
         <p:spPr>
           <a:xfrm>
-            <a:off x="682625" y="2010137"/>
-            <a:ext cx="10515600" cy="4351338"/>
+            <a:off x="838199" y="1825625"/>
+            <a:ext cx="10515599" cy="4351338"/>
           </a:xfrm>
         </p:spPr>
         <p:txBody>
           <a:bodyPr>
-            <a:normAutofit fontScale="92500" lnSpcReduction="20000"/>
+            <a:normAutofit/>
           </a:bodyPr>
           <a:lstStyle/>
           <a:p>
             <a:r>
-              <a:rPr lang="en-US" sz="2400" dirty="0" smtClean="0"/>
-              <a:t>There may be cases where matching a caller with exact method can be confusing. In such cases, Java language specification lays down certain rules to deicide as to how the resolution happens.</a:t>
-            </a:r>
-          </a:p>
-          <a:p>
-            <a:r>
-              <a:rPr lang="en-US" sz="2400" dirty="0" smtClean="0"/>
-              <a:t>Some important rules for method selection: </a:t>
+              <a:rPr lang="en-US" dirty="0" smtClean="0"/>
+              <a:t>There </a:t>
+            </a:r>
+            <a:r>
+              <a:rPr lang="en-US" dirty="0" smtClean="0"/>
+              <a:t>are two types of exceptions in java </a:t>
             </a:r>
           </a:p>
           <a:p>
             <a:pPr lvl="1"/>
             <a:r>
-              <a:rPr lang="en-US" sz="2200" dirty="0" smtClean="0"/>
-              <a:t>Exact match : </a:t>
-            </a:r>
-            <a:r>
-              <a:rPr lang="en-US" sz="2400" dirty="0" smtClean="0"/>
-              <a:t>show</a:t>
-            </a:r>
-            <a:r>
-              <a:rPr lang="en-US" sz="2200" dirty="0" smtClean="0"/>
-              <a:t>(Object) &amp; </a:t>
-            </a:r>
-            <a:r>
-              <a:rPr lang="en-US" sz="2400" dirty="0" smtClean="0"/>
-              <a:t>show</a:t>
-            </a:r>
-            <a:r>
-              <a:rPr lang="en-US" sz="2200" dirty="0" smtClean="0"/>
-              <a:t>(String)</a:t>
+              <a:rPr lang="en-US" sz="2000" dirty="0" smtClean="0"/>
+              <a:t>Unchecked.</a:t>
             </a:r>
           </a:p>
           <a:p>
             <a:pPr lvl="2"/>
             <a:r>
               <a:rPr lang="en-US" sz="2000" dirty="0" smtClean="0"/>
-              <a:t>If we call the above method as </a:t>
-            </a:r>
-            <a:r>
-              <a:rPr lang="en-US" sz="2000" dirty="0"/>
-              <a:t>show </a:t>
-            </a:r>
+              <a:t>Are those which are raised due to programming errors or situations which are irrecoverable. The compiler does not force the programmer to handle such sort of exceptions and it is upon programmers discretion to handle them or leave them.</a:t>
+            </a:r>
+          </a:p>
+          <a:p>
+            <a:pPr lvl="2"/>
             <a:r>
               <a:rPr lang="en-US" sz="2000" dirty="0" smtClean="0"/>
-              <a:t>(“OCP”) then since input is a string hence exact matching method which is show(String) is called rather than show(Object).</a:t>
+              <a:t>All exception classes inheriting from </a:t>
+            </a:r>
+            <a:r>
+              <a:rPr lang="en-US" sz="2000" b="1" i="1" u="sng" dirty="0" smtClean="0"/>
+              <a:t>Error &amp; </a:t>
+            </a:r>
+            <a:r>
+              <a:rPr lang="en-US" sz="2000" b="1" i="1" u="sng" dirty="0" err="1" smtClean="0"/>
+              <a:t>RuntimeException</a:t>
+            </a:r>
+            <a:r>
+              <a:rPr lang="en-US" sz="2000" dirty="0" smtClean="0"/>
+              <a:t> are examples of unchecked exceptions.</a:t>
             </a:r>
           </a:p>
           <a:p>
             <a:pPr lvl="1"/>
             <a:r>
-              <a:rPr lang="en-US" sz="2200" dirty="0" smtClean="0"/>
-              <a:t>Specificity : Nearest matching parameters in terms of inheritance hierarchy.</a:t>
+              <a:rPr lang="en-US" sz="2000" dirty="0" smtClean="0"/>
+              <a:t>Checked</a:t>
             </a:r>
           </a:p>
           <a:p>
             <a:pPr lvl="2"/>
             <a:r>
               <a:rPr lang="en-US" sz="2000" dirty="0" smtClean="0"/>
-              <a:t>If no methods as per the exact match rule fit then a method which has nearest </a:t>
-            </a:r>
-            <a:r>
-              <a:rPr lang="en-US" sz="2000" dirty="0" err="1" smtClean="0"/>
-              <a:t>matach</a:t>
-            </a:r>
-            <a:r>
-              <a:rPr lang="en-US" sz="2000" dirty="0" smtClean="0"/>
-              <a:t> parameters as per the inheritance hierarchy is matched.</a:t>
+              <a:t>Those exception which compiler forces the programmer to mandatorily handle.</a:t>
             </a:r>
           </a:p>
           <a:p>
             <a:pPr lvl="2"/>
             <a:r>
-              <a:rPr lang="en-US" sz="2000" dirty="0" smtClean="0"/>
-              <a:t>In case of primitives, java defines a custom hierarchy which is mainly in terms of size as follows : </a:t>
-            </a:r>
-          </a:p>
-          <a:p>
-            <a:pPr lvl="3"/>
-            <a:r>
-              <a:rPr lang="en-US" sz="1800" dirty="0" smtClean="0"/>
-              <a:t>double &gt; float &gt; long &gt; </a:t>
-            </a:r>
-            <a:r>
-              <a:rPr lang="en-US" sz="1800" dirty="0" err="1" smtClean="0"/>
-              <a:t>int</a:t>
-            </a:r>
-            <a:r>
-              <a:rPr lang="en-US" sz="1800" dirty="0" smtClean="0"/>
-              <a:t>  &gt; char</a:t>
-            </a:r>
-          </a:p>
-          <a:p>
-            <a:pPr lvl="3"/>
-            <a:r>
-              <a:rPr lang="en-US" sz="1800" dirty="0" err="1"/>
-              <a:t>i</a:t>
-            </a:r>
-            <a:r>
-              <a:rPr lang="en-US" sz="1800" dirty="0" err="1" smtClean="0"/>
-              <a:t>nt</a:t>
-            </a:r>
-            <a:r>
-              <a:rPr lang="en-US" sz="1800" dirty="0" smtClean="0"/>
-              <a:t> &gt; short &gt; byte</a:t>
-            </a:r>
-          </a:p>
-          <a:p>
-            <a:pPr lvl="1"/>
-            <a:r>
-              <a:rPr lang="en-US" sz="2200" dirty="0" smtClean="0"/>
-              <a:t>Widening before </a:t>
-            </a:r>
-            <a:r>
-              <a:rPr lang="en-US" sz="2200" dirty="0" err="1" smtClean="0"/>
-              <a:t>Autoboxing</a:t>
-            </a:r>
-            <a:endParaRPr lang="en-US" sz="2200" dirty="0"/>
-          </a:p>
-          <a:p>
-            <a:pPr lvl="2"/>
-            <a:r>
-              <a:rPr lang="en-US" sz="2000" dirty="0"/>
-              <a:t>Instead of falling onto wrapper classes try with primitives that </a:t>
-            </a:r>
-            <a:r>
-              <a:rPr lang="en-US" sz="2000" dirty="0" smtClean="0"/>
-              <a:t>are </a:t>
-            </a:r>
-            <a:r>
-              <a:rPr lang="en-US" sz="2000" dirty="0"/>
-              <a:t>higher up in the hierarchy.</a:t>
-            </a:r>
-          </a:p>
-          <a:p>
-            <a:pPr lvl="2"/>
-            <a:endParaRPr lang="en-US" sz="2000" dirty="0" smtClean="0"/>
+              <a:rPr lang="en-US" sz="2000" noProof="1" smtClean="0"/>
+              <a:t>All exception classes extending from </a:t>
+            </a:r>
+            <a:r>
+              <a:rPr lang="en-US" sz="2000" b="1" i="1" u="sng" noProof="1" smtClean="0"/>
+              <a:t>Exception</a:t>
+            </a:r>
+            <a:r>
+              <a:rPr lang="en-US" sz="2000" noProof="1" smtClean="0"/>
+              <a:t> class or any subclass except that of RuntimeException.</a:t>
+            </a:r>
+            <a:endParaRPr lang="en-US" sz="2000" noProof="1"/>
           </a:p>
         </p:txBody>
       </p:sp>
@@ -5359,7 +5287,12 @@
             <p:ph type="sldNum" sz="quarter" idx="10"/>
           </p:nvPr>
         </p:nvSpPr>
-        <p:spPr/>
+        <p:spPr>
+          <a:xfrm>
+            <a:off x="11353800" y="6361475"/>
+            <a:ext cx="838200" cy="360000"/>
+          </a:xfrm>
+        </p:spPr>
         <p:txBody>
           <a:bodyPr/>
           <a:lstStyle/>
@@ -5385,7 +5318,7 @@
                 <a16:creationId xmlns:a16="http://schemas.microsoft.com/office/drawing/2014/main" id="{5F253864-26FA-4AB1-9F0A-4F57D870EE85}"/>
               </a:ext>
               <a:ext uri="{C183D7F6-B498-43B3-948B-1728B52AA6E4}">
-                <adec:decorative xmlns="" xmlns:adec="http://schemas.microsoft.com/office/drawing/2017/decorative" val="1"/>
+                <adec:decorative xmlns:adec="http://schemas.microsoft.com/office/drawing/2017/decorative" xmlns="" val="1"/>
               </a:ext>
             </a:extLst>
           </p:cNvPr>
@@ -5438,7 +5371,7 @@
     </p:spTree>
     <p:extLst>
       <p:ext uri="{BB962C8B-B14F-4D97-AF65-F5344CB8AC3E}">
-        <p14:creationId xmlns:p14="http://schemas.microsoft.com/office/powerpoint/2010/main" val="1123601731"/>
+        <p14:creationId xmlns:p14="http://schemas.microsoft.com/office/powerpoint/2010/main" val="859118885"/>
       </p:ext>
     </p:extLst>
   </p:cSld>
@@ -5490,8 +5423,8 @@
         </p:nvSpPr>
         <p:spPr>
           <a:xfrm>
-            <a:off x="838200" y="641855"/>
-            <a:ext cx="10515600" cy="772107"/>
+            <a:off x="838199" y="611079"/>
+            <a:ext cx="10515600" cy="833663"/>
           </a:xfrm>
         </p:spPr>
         <p:txBody>
@@ -5501,7 +5434,7 @@
             <a:pPr algn="ctr"/>
             <a:r>
               <a:rPr lang="en-US" dirty="0" smtClean="0"/>
-              <a:t>Passing parameters to method</a:t>
+              <a:t>Handling Multiple Exceptions</a:t>
             </a:r>
             <a:endParaRPr lang="en-US" dirty="0"/>
           </a:p>
@@ -5509,7 +5442,13 @@
       </p:sp>
       <p:sp>
         <p:nvSpPr>
-          <p:cNvPr id="6" name="Content Placeholder 5"/>
+          <p:cNvPr id="3" name="Content Placeholder 2">
+            <a:extLst>
+              <a:ext uri="{FF2B5EF4-FFF2-40B4-BE49-F238E27FC236}">
+                <a16:creationId xmlns:a16="http://schemas.microsoft.com/office/drawing/2014/main" id="{FA6A4B49-27C8-46B6-8B11-AD7E8F615E2C}"/>
+              </a:ext>
+            </a:extLst>
+          </p:cNvPr>
           <p:cNvSpPr>
             <a:spLocks noGrp="1"/>
           </p:cNvSpPr>
@@ -5519,8 +5458,8 @@
         </p:nvSpPr>
         <p:spPr>
           <a:xfrm>
-            <a:off x="682625" y="2010137"/>
-            <a:ext cx="10515600" cy="4351338"/>
+            <a:off x="838199" y="1825625"/>
+            <a:ext cx="10515599" cy="4351338"/>
           </a:xfrm>
         </p:spPr>
         <p:txBody>
@@ -5529,29 +5468,32 @@
           </a:bodyPr>
           <a:lstStyle/>
           <a:p>
+            <a:endParaRPr lang="en-US" sz="2800" dirty="0" smtClean="0"/>
+          </a:p>
+          <a:p>
             <a:r>
               <a:rPr lang="en-US" sz="2800" dirty="0" smtClean="0"/>
-              <a:t>Parameters to a method can be passed using a technique called as pass-by-value.</a:t>
+              <a:t>A finally block is sure piece of code. This means that whether and exception occurs or not , the code in finally block is guaranteed to be executed.</a:t>
             </a:r>
           </a:p>
           <a:p>
             <a:r>
               <a:rPr lang="en-US" sz="2800" dirty="0" smtClean="0"/>
-              <a:t>This mainly means that when a method call happens then the value contained in the input variable is copied onto the method parameters.</a:t>
-            </a:r>
-          </a:p>
-          <a:p>
+              <a:t>This is  a common place to close any open database connection or file streams or other common tasks like setting objects to null, </a:t>
+            </a:r>
+            <a:r>
+              <a:rPr lang="en-US" sz="2800" dirty="0" err="1" smtClean="0"/>
+              <a:t>rsetting</a:t>
+            </a:r>
             <a:r>
               <a:rPr lang="en-US" sz="2800" dirty="0" smtClean="0"/>
-              <a:t>In the case where we pass a reference variable, address of the object referenced by the input reference variable is copied onto method parameter reference variable. So essentially the input variable and the reference variable point to the same object.</a:t>
-            </a:r>
-          </a:p>
-          <a:p>
+              <a:t> any value etc. </a:t>
+            </a:r>
             <a:r>
               <a:rPr lang="en-US" sz="2800" dirty="0" smtClean="0"/>
-              <a:t>Returning value from a method also uses pass-by-value technique.</a:t>
-            </a:r>
-            <a:endParaRPr lang="en-US" dirty="0" smtClean="0"/>
+              <a:t>This block ideally contains code that is used for cleaning up affairs.</a:t>
+            </a:r>
+            <a:endParaRPr lang="en-US" sz="2800" dirty="0" smtClean="0"/>
           </a:p>
         </p:txBody>
       </p:sp>
@@ -5571,7 +5513,12 @@
             <p:ph type="sldNum" sz="quarter" idx="10"/>
           </p:nvPr>
         </p:nvSpPr>
-        <p:spPr/>
+        <p:spPr>
+          <a:xfrm>
+            <a:off x="11353800" y="6361475"/>
+            <a:ext cx="838200" cy="360000"/>
+          </a:xfrm>
+        </p:spPr>
         <p:txBody>
           <a:bodyPr/>
           <a:lstStyle/>
@@ -5597,7 +5544,7 @@
                 <a16:creationId xmlns:a16="http://schemas.microsoft.com/office/drawing/2014/main" id="{5F253864-26FA-4AB1-9F0A-4F57D870EE85}"/>
               </a:ext>
               <a:ext uri="{C183D7F6-B498-43B3-948B-1728B52AA6E4}">
-                <adec:decorative xmlns="" xmlns:adec="http://schemas.microsoft.com/office/drawing/2017/decorative" val="1"/>
+                <adec:decorative xmlns:adec="http://schemas.microsoft.com/office/drawing/2017/decorative" xmlns="" val="1"/>
               </a:ext>
             </a:extLst>
           </p:cNvPr>
@@ -5650,7 +5597,7 @@
     </p:spTree>
     <p:extLst>
       <p:ext uri="{BB962C8B-B14F-4D97-AF65-F5344CB8AC3E}">
-        <p14:creationId xmlns:p14="http://schemas.microsoft.com/office/powerpoint/2010/main" val="3716105547"/>
+        <p14:creationId xmlns:p14="http://schemas.microsoft.com/office/powerpoint/2010/main" val="2322328032"/>
       </p:ext>
     </p:extLst>
   </p:cSld>
@@ -5702,7 +5649,7 @@
         </p:nvSpPr>
         <p:spPr>
           <a:xfrm>
-            <a:off x="838200" y="641855"/>
+            <a:off x="838199" y="641857"/>
             <a:ext cx="10515600" cy="772107"/>
           </a:xfrm>
         </p:spPr>
@@ -5712,16 +5659,22 @@
           <a:p>
             <a:pPr algn="ctr"/>
             <a:r>
-              <a:rPr lang="en-US" dirty="0" smtClean="0"/>
-              <a:t>Constructors : Object Initializers</a:t>
-            </a:r>
-            <a:endParaRPr lang="en-US" dirty="0"/>
-          </a:p>
-        </p:txBody>
-      </p:sp>
-      <p:sp>
-        <p:nvSpPr>
-          <p:cNvPr id="6" name="Content Placeholder 5"/>
+              <a:rPr lang="en-US" sz="3600" dirty="0" smtClean="0"/>
+              <a:t>Exceptions in Static Initializers</a:t>
+            </a:r>
+            <a:endParaRPr lang="en-US" sz="3600" dirty="0"/>
+          </a:p>
+        </p:txBody>
+      </p:sp>
+      <p:sp>
+        <p:nvSpPr>
+          <p:cNvPr id="3" name="Content Placeholder 2">
+            <a:extLst>
+              <a:ext uri="{FF2B5EF4-FFF2-40B4-BE49-F238E27FC236}">
+                <a16:creationId xmlns:a16="http://schemas.microsoft.com/office/drawing/2014/main" id="{FA6A4B49-27C8-46B6-8B11-AD7E8F615E2C}"/>
+              </a:ext>
+            </a:extLst>
+          </p:cNvPr>
           <p:cNvSpPr>
             <a:spLocks noGrp="1"/>
           </p:cNvSpPr>
@@ -5731,8 +5684,8 @@
         </p:nvSpPr>
         <p:spPr>
           <a:xfrm>
-            <a:off x="682625" y="2010137"/>
-            <a:ext cx="10515600" cy="4351338"/>
+            <a:off x="838199" y="1825625"/>
+            <a:ext cx="10515599" cy="4351338"/>
           </a:xfrm>
         </p:spPr>
         <p:txBody>
@@ -5746,52 +5699,34 @@
           <a:p>
             <a:r>
               <a:rPr lang="en-US" sz="2800" dirty="0" smtClean="0"/>
-              <a:t>Object creation is a multi step process which includes the following : </a:t>
+              <a:t>Static Initializers are the piece of code that are called when the class is loaded by the JVM for the first time.</a:t>
+            </a:r>
+          </a:p>
+          <a:p>
+            <a:r>
+              <a:rPr lang="en-US" sz="2800" dirty="0" smtClean="0"/>
+              <a:t>There is no application code that directly invokes it.</a:t>
+            </a:r>
+          </a:p>
+          <a:p>
+            <a:r>
+              <a:rPr lang="en-US" sz="2800" dirty="0" smtClean="0"/>
+              <a:t>As a result following applies to static initializers : </a:t>
             </a:r>
           </a:p>
           <a:p>
             <a:pPr lvl="1"/>
             <a:r>
-              <a:rPr lang="en-US" sz="2800" dirty="0" smtClean="0"/>
-              <a:t>Loading the class of the object into  memory.</a:t>
+              <a:rPr lang="en-US" sz="2600" dirty="0" smtClean="0"/>
+              <a:t>No unchecked exceptions are allowed to be thrown from within the static initializer block.</a:t>
             </a:r>
           </a:p>
           <a:p>
             <a:pPr lvl="1"/>
             <a:r>
-              <a:rPr lang="en-US" sz="2800" dirty="0" smtClean="0"/>
-              <a:t>Allocating space </a:t>
-            </a:r>
-            <a:r>
-              <a:rPr lang="en-US" sz="2800" dirty="0"/>
-              <a:t>to the </a:t>
-            </a:r>
-            <a:r>
-              <a:rPr lang="en-US" sz="2800" dirty="0" smtClean="0"/>
-              <a:t>object in the heap memory.</a:t>
-            </a:r>
-          </a:p>
-          <a:p>
-            <a:pPr lvl="1"/>
-            <a:r>
-              <a:rPr lang="en-US" sz="2800" dirty="0" smtClean="0"/>
-              <a:t>Initializing the members of the object with their respective default values.</a:t>
-            </a:r>
-          </a:p>
-          <a:p>
-            <a:pPr lvl="1"/>
-            <a:r>
-              <a:rPr lang="en-US" sz="2800" dirty="0" smtClean="0"/>
-              <a:t>Calling the object initializers and constructor.</a:t>
-            </a:r>
-            <a:r>
-              <a:rPr lang="en-US" sz="2800" dirty="0"/>
-              <a:t> to the object.</a:t>
-            </a:r>
-          </a:p>
-          <a:p>
-            <a:pPr lvl="1"/>
-            <a:endParaRPr lang="en-US" sz="2800" dirty="0" smtClean="0"/>
+              <a:rPr lang="en-US" sz="2600" dirty="0" smtClean="0"/>
+              <a:t>Checked exceptions must be handled within the body of the static initializer block and are not allowed to be propagated further.</a:t>
+            </a:r>
           </a:p>
         </p:txBody>
       </p:sp>
@@ -5811,7 +5746,12 @@
             <p:ph type="sldNum" sz="quarter" idx="10"/>
           </p:nvPr>
         </p:nvSpPr>
-        <p:spPr/>
+        <p:spPr>
+          <a:xfrm>
+            <a:off x="11353800" y="6361475"/>
+            <a:ext cx="838200" cy="360000"/>
+          </a:xfrm>
+        </p:spPr>
         <p:txBody>
           <a:bodyPr/>
           <a:lstStyle/>
@@ -5837,7 +5777,7 @@
                 <a16:creationId xmlns:a16="http://schemas.microsoft.com/office/drawing/2014/main" id="{5F253864-26FA-4AB1-9F0A-4F57D870EE85}"/>
               </a:ext>
               <a:ext uri="{C183D7F6-B498-43B3-948B-1728B52AA6E4}">
-                <adec:decorative xmlns="" xmlns:adec="http://schemas.microsoft.com/office/drawing/2017/decorative" val="1"/>
+                <adec:decorative xmlns:adec="http://schemas.microsoft.com/office/drawing/2017/decorative" xmlns="" val="1"/>
               </a:ext>
             </a:extLst>
           </p:cNvPr>
@@ -5890,7 +5830,7 @@
     </p:spTree>
     <p:extLst>
       <p:ext uri="{BB962C8B-B14F-4D97-AF65-F5344CB8AC3E}">
-        <p14:creationId xmlns:p14="http://schemas.microsoft.com/office/powerpoint/2010/main" val="1367291688"/>
+        <p14:creationId xmlns:p14="http://schemas.microsoft.com/office/powerpoint/2010/main" val="2291679552"/>
       </p:ext>
     </p:extLst>
   </p:cSld>
@@ -5942,7 +5882,7 @@
         </p:nvSpPr>
         <p:spPr>
           <a:xfrm>
-            <a:off x="838200" y="641855"/>
+            <a:off x="838199" y="641857"/>
             <a:ext cx="10515600" cy="772107"/>
           </a:xfrm>
         </p:spPr>
@@ -5952,16 +5892,22 @@
           <a:p>
             <a:pPr algn="ctr"/>
             <a:r>
-              <a:rPr lang="en-US" dirty="0" smtClean="0"/>
-              <a:t>Constructors : Object Initializers</a:t>
-            </a:r>
-            <a:endParaRPr lang="en-US" dirty="0"/>
-          </a:p>
-        </p:txBody>
-      </p:sp>
-      <p:sp>
-        <p:nvSpPr>
-          <p:cNvPr id="6" name="Content Placeholder 5"/>
+              <a:rPr lang="en-US" sz="3600" dirty="0" smtClean="0"/>
+              <a:t>Exceptions in Initializers</a:t>
+            </a:r>
+            <a:endParaRPr lang="en-US" sz="3600" dirty="0"/>
+          </a:p>
+        </p:txBody>
+      </p:sp>
+      <p:sp>
+        <p:nvSpPr>
+          <p:cNvPr id="3" name="Content Placeholder 2">
+            <a:extLst>
+              <a:ext uri="{FF2B5EF4-FFF2-40B4-BE49-F238E27FC236}">
+                <a16:creationId xmlns:a16="http://schemas.microsoft.com/office/drawing/2014/main" id="{FA6A4B49-27C8-46B6-8B11-AD7E8F615E2C}"/>
+              </a:ext>
+            </a:extLst>
+          </p:cNvPr>
           <p:cNvSpPr>
             <a:spLocks noGrp="1"/>
           </p:cNvSpPr>
@@ -5971,54 +5917,56 @@
         </p:nvSpPr>
         <p:spPr>
           <a:xfrm>
-            <a:off x="682625" y="2010137"/>
-            <a:ext cx="10515600" cy="4351338"/>
+            <a:off x="838199" y="1825625"/>
+            <a:ext cx="10515599" cy="4351338"/>
           </a:xfrm>
         </p:spPr>
         <p:txBody>
           <a:bodyPr>
-            <a:normAutofit fontScale="92500"/>
+            <a:normAutofit fontScale="92500" lnSpcReduction="10000"/>
           </a:bodyPr>
           <a:lstStyle/>
           <a:p>
             <a:r>
               <a:rPr lang="en-US" sz="2800" dirty="0" smtClean="0"/>
-              <a:t>Objects in java are created using the new operator. The new operator is followed by a method call , in which the name of the method is same as that of the class of object. This is a special method called as a constructor. Its primary work is to allow the writers of a class to initialize their objects with appropriate values.</a:t>
+              <a:t>Static Initializers are the piece of code that are called when the class is loaded by the JVM for the first time.</a:t>
             </a:r>
           </a:p>
           <a:p>
             <a:r>
               <a:rPr lang="en-US" sz="2800" dirty="0" smtClean="0"/>
-              <a:t>Following points are worth noticeable about constructors :  </a:t>
+              <a:t>There is no application code that directly invokes it.</a:t>
+            </a:r>
+          </a:p>
+          <a:p>
+            <a:r>
+              <a:rPr lang="en-US" sz="2800" dirty="0" smtClean="0"/>
+              <a:t>As a result following applies to static initializers : </a:t>
             </a:r>
           </a:p>
           <a:p>
             <a:pPr lvl="1"/>
             <a:r>
               <a:rPr lang="en-US" sz="2600" dirty="0" smtClean="0"/>
-              <a:t>Name of the constructor is same as the name of the class.</a:t>
+              <a:t>No unchecked exceptions are allowed to be thrown from within the static initializer block.</a:t>
             </a:r>
           </a:p>
           <a:p>
             <a:pPr lvl="1"/>
             <a:r>
               <a:rPr lang="en-US" sz="2600" dirty="0" smtClean="0"/>
-              <a:t>It does not have a return type.</a:t>
-            </a:r>
-          </a:p>
-          <a:p>
-            <a:pPr lvl="1"/>
-            <a:r>
-              <a:rPr lang="en-US" sz="2600" dirty="0" smtClean="0"/>
-              <a:t>It can have accessibility specifiers.</a:t>
-            </a:r>
-          </a:p>
-          <a:p>
-            <a:pPr lvl="1"/>
-            <a:r>
-              <a:rPr lang="en-US" sz="2600" dirty="0" smtClean="0"/>
-              <a:t>It can be overloaded and hence different versions of overloaded constructor can be called while creating an object using the new operator.</a:t>
-            </a:r>
+              <a:t>Checked exceptions must be handled within the body of the static initializer block and are not allowed to be propagated further.</a:t>
+            </a:r>
+          </a:p>
+          <a:p>
+            <a:r>
+              <a:rPr lang="en-US" sz="2800" dirty="0" smtClean="0"/>
+              <a:t>In case of Instance initializer, programmer does have a way to handle the exceptions via the constructors. Hence the instance initializer can throw checked exceptions provided the constructor provides a throws clause listing the same exception there.</a:t>
+            </a:r>
+            <a:endParaRPr lang="en-US" sz="2800" dirty="0"/>
+          </a:p>
+          <a:p>
+            <a:endParaRPr lang="en-US" sz="2800" dirty="0" smtClean="0"/>
           </a:p>
         </p:txBody>
       </p:sp>
@@ -6038,7 +5986,12 @@
             <p:ph type="sldNum" sz="quarter" idx="10"/>
           </p:nvPr>
         </p:nvSpPr>
-        <p:spPr/>
+        <p:spPr>
+          <a:xfrm>
+            <a:off x="11353800" y="6361475"/>
+            <a:ext cx="838200" cy="360000"/>
+          </a:xfrm>
+        </p:spPr>
         <p:txBody>
           <a:bodyPr/>
           <a:lstStyle/>
@@ -6064,7 +6017,7 @@
                 <a16:creationId xmlns:a16="http://schemas.microsoft.com/office/drawing/2014/main" id="{5F253864-26FA-4AB1-9F0A-4F57D870EE85}"/>
               </a:ext>
               <a:ext uri="{C183D7F6-B498-43B3-948B-1728B52AA6E4}">
-                <adec:decorative xmlns="" xmlns:adec="http://schemas.microsoft.com/office/drawing/2017/decorative" val="1"/>
+                <adec:decorative xmlns:adec="http://schemas.microsoft.com/office/drawing/2017/decorative" xmlns="" val="1"/>
               </a:ext>
             </a:extLst>
           </p:cNvPr>
@@ -6117,7 +6070,7 @@
     </p:spTree>
     <p:extLst>
       <p:ext uri="{BB962C8B-B14F-4D97-AF65-F5344CB8AC3E}">
-        <p14:creationId xmlns:p14="http://schemas.microsoft.com/office/powerpoint/2010/main" val="1189419766"/>
+        <p14:creationId xmlns:p14="http://schemas.microsoft.com/office/powerpoint/2010/main" val="3057752647"/>
       </p:ext>
     </p:extLst>
   </p:cSld>
@@ -6169,7 +6122,7 @@
         </p:nvSpPr>
         <p:spPr>
           <a:xfrm>
-            <a:off x="838200" y="641855"/>
+            <a:off x="838199" y="641857"/>
             <a:ext cx="10515600" cy="772107"/>
           </a:xfrm>
         </p:spPr>
@@ -6179,16 +6132,22 @@
           <a:p>
             <a:pPr algn="ctr"/>
             <a:r>
-              <a:rPr lang="en-US" dirty="0" smtClean="0"/>
-              <a:t>Constructors : Object Initializers</a:t>
-            </a:r>
-            <a:endParaRPr lang="en-US" dirty="0"/>
-          </a:p>
-        </p:txBody>
-      </p:sp>
-      <p:sp>
-        <p:nvSpPr>
-          <p:cNvPr id="6" name="Content Placeholder 5"/>
+              <a:rPr lang="en-US" sz="3600" dirty="0" smtClean="0"/>
+              <a:t>Other Points</a:t>
+            </a:r>
+            <a:endParaRPr lang="en-US" sz="3600" dirty="0"/>
+          </a:p>
+        </p:txBody>
+      </p:sp>
+      <p:sp>
+        <p:nvSpPr>
+          <p:cNvPr id="3" name="Content Placeholder 2">
+            <a:extLst>
+              <a:ext uri="{FF2B5EF4-FFF2-40B4-BE49-F238E27FC236}">
+                <a16:creationId xmlns:a16="http://schemas.microsoft.com/office/drawing/2014/main" id="{FA6A4B49-27C8-46B6-8B11-AD7E8F615E2C}"/>
+              </a:ext>
+            </a:extLst>
+          </p:cNvPr>
           <p:cNvSpPr>
             <a:spLocks noGrp="1"/>
           </p:cNvSpPr>
@@ -6198,61 +6157,52 @@
         </p:nvSpPr>
         <p:spPr>
           <a:xfrm>
-            <a:off x="682625" y="2010137"/>
-            <a:ext cx="10515600" cy="4351338"/>
+            <a:off x="838199" y="1825625"/>
+            <a:ext cx="10515599" cy="4351338"/>
           </a:xfrm>
         </p:spPr>
         <p:txBody>
           <a:bodyPr>
-            <a:normAutofit fontScale="92500" lnSpcReduction="20000"/>
+            <a:normAutofit fontScale="92500"/>
           </a:bodyPr>
           <a:lstStyle/>
           <a:p>
             <a:r>
               <a:rPr lang="en-US" sz="2800" dirty="0" smtClean="0"/>
-              <a:t>Objects in java are created using the new operator. The new operator is followed by a method call , in which the name of the method is same as that of the class of object. This is a special method called as a constructor. Its primary work is to allow the writers of a class to initialize their objects with appropriate values.</a:t>
+              <a:t>Exceptions in a constructor are no different than any other method except for one case which is in the case of super-sub class relationship.</a:t>
             </a:r>
           </a:p>
           <a:p>
             <a:r>
               <a:rPr lang="en-US" sz="2800" dirty="0" smtClean="0"/>
-              <a:t>Following points are worth noticeable about constructors :  </a:t>
-            </a:r>
-          </a:p>
-          <a:p>
-            <a:pPr lvl="1"/>
-            <a:r>
-              <a:rPr lang="en-US" sz="2600" dirty="0" smtClean="0"/>
-              <a:t>Name of the constructor is same as the name of the class.</a:t>
-            </a:r>
-          </a:p>
-          <a:p>
-            <a:pPr lvl="1"/>
-            <a:r>
-              <a:rPr lang="en-US" sz="2600" dirty="0" smtClean="0"/>
-              <a:t>It does not have a return type.</a:t>
-            </a:r>
-          </a:p>
-          <a:p>
-            <a:pPr lvl="1"/>
-            <a:r>
-              <a:rPr lang="en-US" sz="2600" dirty="0" smtClean="0"/>
-              <a:t>It can have accessibility specifiers.</a:t>
-            </a:r>
-          </a:p>
-          <a:p>
-            <a:pPr lvl="1"/>
-            <a:r>
-              <a:rPr lang="en-US" sz="2600" dirty="0" smtClean="0"/>
-              <a:t>It can be overloaded and hence different versions of overloaded constructor can be called while creating an object using the new operator.</a:t>
-            </a:r>
-          </a:p>
-          <a:p>
-            <a:pPr lvl="1"/>
-            <a:r>
-              <a:rPr lang="en-US" sz="2600" dirty="0" smtClean="0"/>
-              <a:t>Every class by default has default constructor. So even if we don’t declare any constructor ,every class has a no argument default constructor.</a:t>
-            </a:r>
+              <a:t>If the super class constructor declares an exception in the throws clause then the subclass must also declare in its throws clause an exception of same class or higher.</a:t>
+            </a:r>
+          </a:p>
+          <a:p>
+            <a:r>
+              <a:rPr lang="en-US" sz="2800" dirty="0" smtClean="0"/>
+              <a:t>Normally we should handle all the exceptions and do something in  catch block to recover from it like log the exception or print the tack trace.</a:t>
+            </a:r>
+          </a:p>
+          <a:p>
+            <a:r>
+              <a:rPr lang="en-US" sz="2800" dirty="0" smtClean="0"/>
+              <a:t>Try block can be nested within another try block.</a:t>
+            </a:r>
+          </a:p>
+          <a:p>
+            <a:r>
+              <a:rPr lang="en-US" sz="2800" dirty="0" smtClean="0"/>
+              <a:t>Exception can also be thrown from a catch or </a:t>
+            </a:r>
+            <a:r>
+              <a:rPr lang="en-US" sz="2800" smtClean="0"/>
+              <a:t>finally block.</a:t>
+            </a:r>
+            <a:endParaRPr lang="en-US" sz="2800" dirty="0" smtClean="0"/>
+          </a:p>
+          <a:p>
+            <a:endParaRPr lang="en-US" sz="2800" dirty="0" smtClean="0"/>
           </a:p>
         </p:txBody>
       </p:sp>
@@ -6272,7 +6222,12 @@
             <p:ph type="sldNum" sz="quarter" idx="10"/>
           </p:nvPr>
         </p:nvSpPr>
-        <p:spPr/>
+        <p:spPr>
+          <a:xfrm>
+            <a:off x="11353800" y="6361475"/>
+            <a:ext cx="838200" cy="360000"/>
+          </a:xfrm>
+        </p:spPr>
         <p:txBody>
           <a:bodyPr/>
           <a:lstStyle/>
@@ -6298,7 +6253,7 @@
                 <a16:creationId xmlns:a16="http://schemas.microsoft.com/office/drawing/2014/main" id="{5F253864-26FA-4AB1-9F0A-4F57D870EE85}"/>
               </a:ext>
               <a:ext uri="{C183D7F6-B498-43B3-948B-1728B52AA6E4}">
-                <adec:decorative xmlns="" xmlns:adec="http://schemas.microsoft.com/office/drawing/2017/decorative" val="1"/>
+                <adec:decorative xmlns:adec="http://schemas.microsoft.com/office/drawing/2017/decorative" xmlns="" val="1"/>
               </a:ext>
             </a:extLst>
           </p:cNvPr>
@@ -6351,7 +6306,7 @@
     </p:spTree>
     <p:extLst>
       <p:ext uri="{BB962C8B-B14F-4D97-AF65-F5344CB8AC3E}">
-        <p14:creationId xmlns:p14="http://schemas.microsoft.com/office/powerpoint/2010/main" val="3739068852"/>
+        <p14:creationId xmlns:p14="http://schemas.microsoft.com/office/powerpoint/2010/main" val="2549937363"/>
       </p:ext>
     </p:extLst>
   </p:cSld>
@@ -6413,12 +6368,8 @@
           <a:p>
             <a:pPr algn="ctr"/>
             <a:r>
-              <a:rPr lang="en-US" dirty="0"/>
-              <a:t>Constructors : </a:t>
-            </a:r>
-            <a:r>
               <a:rPr lang="en-US" dirty="0" smtClean="0"/>
-              <a:t>Instance Initializers</a:t>
+              <a:t>Checked &amp; Unchecked Exceptions</a:t>
             </a:r>
             <a:endParaRPr lang="en-US" dirty="0"/>
           </a:p>
@@ -6442,47 +6393,41 @@
         </p:nvSpPr>
         <p:spPr>
           <a:xfrm>
-            <a:off x="838199" y="1834861"/>
-            <a:ext cx="10515599" cy="4351338"/>
+            <a:off x="838199" y="1825625"/>
+            <a:ext cx="6689437" cy="4351338"/>
           </a:xfrm>
         </p:spPr>
         <p:txBody>
           <a:bodyPr>
-            <a:normAutofit lnSpcReduction="10000"/>
+            <a:normAutofit/>
           </a:bodyPr>
           <a:lstStyle/>
           <a:p>
             <a:r>
               <a:rPr lang="en-US" dirty="0" smtClean="0"/>
-              <a:t>Instance initializer blocks are curly braced blocks of code that are used for initialization of the object of the class. They are not part of any method but are independent blocks of code. A class can have any number of instance initializer blocks and are executed in order in which they are specified in the class.</a:t>
-            </a:r>
-          </a:p>
-          <a:p>
+              <a:t>All exception classes except those under Error &amp; </a:t>
+            </a:r>
+            <a:r>
+              <a:rPr lang="en-US" dirty="0" err="1" smtClean="0"/>
+              <a:t>RuntimeException</a:t>
+            </a:r>
             <a:r>
               <a:rPr lang="en-US" dirty="0" smtClean="0"/>
-              <a:t> These are used to initialize all the member variables of the class including static as well as non-static.</a:t>
-            </a:r>
-          </a:p>
-          <a:p>
-            <a:r>
-              <a:rPr lang="en-US" dirty="0" smtClean="0"/>
-              <a:t>Expressions in an instance initializer block follow a declare-before-read rule. This means that an expression inside of instance initializer block can read the value of a variable only if the variable is already declared before the instance initializer block.</a:t>
-            </a:r>
-          </a:p>
-          <a:p>
-            <a:r>
-              <a:rPr lang="en-US" dirty="0" smtClean="0"/>
-              <a:t>Alternatively if an expression forward references a variable inside of instance initializer i.e. uses a variable before it has been declared then it is only allowed to assign a value to the forward referencing variable but cannot read from the yet undeclared variable.</a:t>
-            </a:r>
-          </a:p>
-          <a:p>
-            <a:r>
-              <a:rPr lang="en-US" dirty="0" smtClean="0"/>
-              <a:t>Instance initializer blocks are generally not needed in common programming practice. It only comes in handy in cases where there are multiple constructors in a class and there needs to be a common code that needs to be called no matter which constructor gets called.</a:t>
-            </a:r>
-          </a:p>
-          <a:p>
-            <a:endParaRPr lang="en-US" sz="2800" b="1" dirty="0" smtClean="0"/>
+              <a:t> are referred to as Checked exceptions. Any user defined exception that extends from these is also a checked exception.</a:t>
+            </a:r>
+          </a:p>
+          <a:p>
+            <a:r>
+              <a:rPr lang="en-US" noProof="1" smtClean="0"/>
+              <a:t>Checked exceptions are those for which the compiler forces the caller to handle the exception explicity. These are those exceptions for which compiler thinks that the caller can successfully recover from.</a:t>
+            </a:r>
+          </a:p>
+          <a:p>
+            <a:r>
+              <a:rPr lang="en-US" noProof="1" smtClean="0"/>
+              <a:t>On the other hand unchecked exceptions are those that compiler wont asks the caller to handle explicitly nd it will be on the diecretion of the programmer to handle them.</a:t>
+            </a:r>
+            <a:endParaRPr lang="en-US" noProof="1"/>
           </a:p>
         </p:txBody>
       </p:sp>
@@ -6533,7 +6478,7 @@
                 <a16:creationId xmlns:a16="http://schemas.microsoft.com/office/drawing/2014/main" id="{5F253864-26FA-4AB1-9F0A-4F57D870EE85}"/>
               </a:ext>
               <a:ext uri="{C183D7F6-B498-43B3-948B-1728B52AA6E4}">
-                <adec:decorative xmlns="" xmlns:adec="http://schemas.microsoft.com/office/drawing/2017/decorative" val="1"/>
+                <adec:decorative xmlns:adec="http://schemas.microsoft.com/office/drawing/2017/decorative" xmlns="" val="1"/>
               </a:ext>
             </a:extLst>
           </p:cNvPr>
@@ -6583,10 +6528,51 @@
           </a:p>
         </p:txBody>
       </p:sp>
+      <p:pic>
+        <p:nvPicPr>
+          <p:cNvPr id="8" name="Picture 10" descr="Java - Exceptions - Tutorialspoint"/>
+          <p:cNvPicPr>
+            <a:picLocks noChangeAspect="1" noChangeArrowheads="1"/>
+          </p:cNvPicPr>
+          <p:nvPr/>
+        </p:nvPicPr>
+        <p:blipFill>
+          <a:blip r:embed="rId2">
+            <a:extLst>
+              <a:ext uri="{28A0092B-C50C-407E-A947-70E740481C1C}">
+                <a14:useLocalDpi xmlns:a14="http://schemas.microsoft.com/office/drawing/2010/main" val="0"/>
+              </a:ext>
+            </a:extLst>
+          </a:blip>
+          <a:srcRect/>
+          <a:stretch>
+            <a:fillRect/>
+          </a:stretch>
+        </p:blipFill>
+        <p:spPr bwMode="auto">
+          <a:xfrm>
+            <a:off x="7924800" y="1978891"/>
+            <a:ext cx="3428998" cy="4198072"/>
+          </a:xfrm>
+          <a:prstGeom prst="rect">
+            <a:avLst/>
+          </a:prstGeom>
+          <a:noFill/>
+          <a:extLst>
+            <a:ext uri="{909E8E84-426E-40DD-AFC4-6F175D3DCCD1}">
+              <a14:hiddenFill xmlns:a14="http://schemas.microsoft.com/office/drawing/2010/main">
+                <a:solidFill>
+                  <a:srgbClr val="FFFFFF"/>
+                </a:solidFill>
+              </a14:hiddenFill>
+            </a:ext>
+          </a:extLst>
+        </p:spPr>
+      </p:pic>
     </p:spTree>
     <p:extLst>
       <p:ext uri="{BB962C8B-B14F-4D97-AF65-F5344CB8AC3E}">
-        <p14:creationId xmlns:p14="http://schemas.microsoft.com/office/powerpoint/2010/main" val="1221906720"/>
+        <p14:creationId xmlns:p14="http://schemas.microsoft.com/office/powerpoint/2010/main" val="3546705181"/>
       </p:ext>
     </p:extLst>
   </p:cSld>
@@ -6625,221 +6611,6 @@
           <p:cNvPr id="2" name="Title 1">
             <a:extLst>
               <a:ext uri="{FF2B5EF4-FFF2-40B4-BE49-F238E27FC236}">
-                <a16:creationId xmlns:a16="http://schemas.microsoft.com/office/drawing/2014/main" id="{E199600F-A17E-4354-A7AB-0CC2A43A9354}"/>
-              </a:ext>
-            </a:extLst>
-          </p:cNvPr>
-          <p:cNvSpPr>
-            <a:spLocks noGrp="1"/>
-          </p:cNvSpPr>
-          <p:nvPr>
-            <p:ph type="title"/>
-          </p:nvPr>
-        </p:nvSpPr>
-        <p:spPr>
-          <a:xfrm>
-            <a:off x="838200" y="641855"/>
-            <a:ext cx="10515600" cy="772107"/>
-          </a:xfrm>
-        </p:spPr>
-        <p:txBody>
-          <a:bodyPr/>
-          <a:lstStyle/>
-          <a:p>
-            <a:pPr algn="ctr"/>
-            <a:r>
-              <a:rPr lang="en-US" dirty="0" smtClean="0"/>
-              <a:t>Static Members</a:t>
-            </a:r>
-            <a:endParaRPr lang="en-US" dirty="0"/>
-          </a:p>
-        </p:txBody>
-      </p:sp>
-      <p:sp>
-        <p:nvSpPr>
-          <p:cNvPr id="4" name="Slide Number Placeholder 3">
-            <a:extLst>
-              <a:ext uri="{FF2B5EF4-FFF2-40B4-BE49-F238E27FC236}">
-                <a16:creationId xmlns:a16="http://schemas.microsoft.com/office/drawing/2014/main" id="{62B4CE3A-8C88-45AA-A849-57E5A7AC22C1}"/>
-              </a:ext>
-            </a:extLst>
-          </p:cNvPr>
-          <p:cNvSpPr>
-            <a:spLocks noGrp="1"/>
-          </p:cNvSpPr>
-          <p:nvPr>
-            <p:ph type="sldNum" sz="quarter" idx="10"/>
-          </p:nvPr>
-        </p:nvSpPr>
-        <p:spPr/>
-        <p:txBody>
-          <a:bodyPr/>
-          <a:lstStyle/>
-          <a:p>
-            <a:r>
-              <a:rPr lang="en-US" dirty="0"/>
-              <a:t>PAGE </a:t>
-            </a:r>
-            <a:fld id="{4A9B5881-4007-4345-955A-79C2656F0C49}" type="slidenum">
-              <a:rPr lang="en-US" smtClean="0"/>
-              <a:pPr/>
-              <a:t>18</a:t>
-            </a:fld>
-            <a:endParaRPr lang="en-US" dirty="0"/>
-          </a:p>
-        </p:txBody>
-      </p:sp>
-      <p:sp>
-        <p:nvSpPr>
-          <p:cNvPr id="11" name="Rectangle 10">
-            <a:extLst>
-              <a:ext uri="{FF2B5EF4-FFF2-40B4-BE49-F238E27FC236}">
-                <a16:creationId xmlns:a16="http://schemas.microsoft.com/office/drawing/2014/main" id="{5F253864-26FA-4AB1-9F0A-4F57D870EE85}"/>
-              </a:ext>
-              <a:ext uri="{C183D7F6-B498-43B3-948B-1728B52AA6E4}">
-                <adec:decorative xmlns="" xmlns:adec="http://schemas.microsoft.com/office/drawing/2017/decorative" val="1"/>
-              </a:ext>
-            </a:extLst>
-          </p:cNvPr>
-          <p:cNvSpPr/>
-          <p:nvPr/>
-        </p:nvSpPr>
-        <p:spPr>
-          <a:xfrm>
-            <a:off x="6249555" y="6562004"/>
-            <a:ext cx="2552123" cy="159471"/>
-          </a:xfrm>
-          <a:prstGeom prst="rect">
-            <a:avLst/>
-          </a:prstGeom>
-          <a:solidFill>
-            <a:schemeClr val="tx1">
-              <a:lumMod val="85000"/>
-              <a:lumOff val="15000"/>
-            </a:schemeClr>
-          </a:solidFill>
-          <a:ln>
-            <a:noFill/>
-          </a:ln>
-        </p:spPr>
-        <p:style>
-          <a:lnRef idx="2">
-            <a:schemeClr val="accent1">
-              <a:shade val="50000"/>
-            </a:schemeClr>
-          </a:lnRef>
-          <a:fillRef idx="1">
-            <a:schemeClr val="accent1"/>
-          </a:fillRef>
-          <a:effectRef idx="0">
-            <a:schemeClr val="accent1"/>
-          </a:effectRef>
-          <a:fontRef idx="minor">
-            <a:schemeClr val="lt1"/>
-          </a:fontRef>
-        </p:style>
-        <p:txBody>
-          <a:bodyPr anchor="ctr"/>
-          <a:lstStyle/>
-          <a:p>
-            <a:pPr algn="ctr"/>
-            <a:endParaRPr lang="en-US" sz="1200" dirty="0"/>
-          </a:p>
-        </p:txBody>
-      </p:sp>
-      <p:sp>
-        <p:nvSpPr>
-          <p:cNvPr id="7" name="Content Placeholder 6"/>
-          <p:cNvSpPr>
-            <a:spLocks noGrp="1"/>
-          </p:cNvSpPr>
-          <p:nvPr>
-            <p:ph idx="1"/>
-          </p:nvPr>
-        </p:nvSpPr>
-        <p:spPr/>
-        <p:txBody>
-          <a:bodyPr>
-            <a:normAutofit fontScale="92500"/>
-          </a:bodyPr>
-          <a:lstStyle/>
-          <a:p>
-            <a:endParaRPr lang="en-US" sz="2400" dirty="0" smtClean="0"/>
-          </a:p>
-          <a:p>
-            <a:r>
-              <a:rPr lang="en-US" sz="2400" dirty="0" smtClean="0"/>
-              <a:t>A class is a blueprint and out of this many object can be instantiated. Each object of the class has its own copy of all the non-static members of the class.</a:t>
-            </a:r>
-          </a:p>
-          <a:p>
-            <a:r>
-              <a:rPr lang="en-US" sz="2400" dirty="0" smtClean="0"/>
-              <a:t>Static members(methods, fields, nested types) of the class on the other hand are the properties of the declaring class. Objects of this class do not get a copy of static members. Instead they all share a common copy of the static members of the class.</a:t>
-            </a:r>
-          </a:p>
-          <a:p>
-            <a:r>
-              <a:rPr lang="en-US" sz="2400" dirty="0" smtClean="0"/>
-              <a:t>This means that if any change is done on the static member of the class , it is reflected at all places.</a:t>
-            </a:r>
-          </a:p>
-          <a:p>
-            <a:r>
-              <a:rPr lang="en-US" sz="2400" dirty="0" smtClean="0"/>
-              <a:t>Recommended way of using a static member of the class is &lt;Class Name&gt;.&lt;static member&gt;.</a:t>
-            </a:r>
-          </a:p>
-          <a:p>
-            <a:r>
-              <a:rPr lang="en-US" sz="2400" dirty="0" smtClean="0"/>
-              <a:t>Entry point function of any application in java which is the main() method is also declared static.</a:t>
-            </a:r>
-          </a:p>
-        </p:txBody>
-      </p:sp>
-    </p:spTree>
-    <p:extLst>
-      <p:ext uri="{BB962C8B-B14F-4D97-AF65-F5344CB8AC3E}">
-        <p14:creationId xmlns:p14="http://schemas.microsoft.com/office/powerpoint/2010/main" val="3058716343"/>
-      </p:ext>
-    </p:extLst>
-  </p:cSld>
-  <p:clrMapOvr>
-    <a:masterClrMapping/>
-  </p:clrMapOvr>
-  <p:timing>
-    <p:tnLst>
-      <p:par>
-        <p:cTn id="1" dur="indefinite" restart="never" nodeType="tmRoot"/>
-      </p:par>
-    </p:tnLst>
-  </p:timing>
-</p:sld>
-</file>
-
-<file path=ppt/slides/slide19.xml><?xml version="1.0" encoding="utf-8"?>
-<p:sld xmlns:a="http://schemas.openxmlformats.org/drawingml/2006/main" xmlns:r="http://schemas.openxmlformats.org/officeDocument/2006/relationships" xmlns:p="http://schemas.openxmlformats.org/presentationml/2006/main">
-  <p:cSld>
-    <p:spTree>
-      <p:nvGrpSpPr>
-        <p:cNvPr id="1" name=""/>
-        <p:cNvGrpSpPr/>
-        <p:nvPr/>
-      </p:nvGrpSpPr>
-      <p:grpSpPr>
-        <a:xfrm>
-          <a:off x="0" y="0"/>
-          <a:ext cx="0" cy="0"/>
-          <a:chOff x="0" y="0"/>
-          <a:chExt cx="0" cy="0"/>
-        </a:xfrm>
-      </p:grpSpPr>
-      <p:sp>
-        <p:nvSpPr>
-          <p:cNvPr id="2" name="Title 1">
-            <a:extLst>
-              <a:ext uri="{FF2B5EF4-FFF2-40B4-BE49-F238E27FC236}">
                 <a16:creationId xmlns:a16="http://schemas.microsoft.com/office/drawing/2014/main" id="{C8F58AE6-56F6-44E8-8BBF-23277B1773E4}"/>
               </a:ext>
             </a:extLst>
@@ -6926,7 +6697,7 @@
             <a:fld id="{4A9B5881-4007-4345-955A-79C2656F0C49}" type="slidenum">
               <a:rPr lang="en-US" smtClean="0"/>
               <a:pPr/>
-              <a:t>19</a:t>
+              <a:t>18</a:t>
             </a:fld>
             <a:endParaRPr lang="en-US" dirty="0"/>
           </a:p>
@@ -6940,7 +6711,7 @@
                 <a16:creationId xmlns:a16="http://schemas.microsoft.com/office/drawing/2014/main" id="{792980D7-ED01-4955-83DB-59BA18C94FBA}"/>
               </a:ext>
               <a:ext uri="{C183D7F6-B498-43B3-948B-1728B52AA6E4}">
-                <adec:decorative xmlns="" xmlns:adec="http://schemas.microsoft.com/office/drawing/2017/decorative" val="1"/>
+                <adec:decorative xmlns:adec="http://schemas.microsoft.com/office/drawing/2017/decorative" xmlns="" val="1"/>
               </a:ext>
             </a:extLst>
           </p:cNvPr>
@@ -7252,7 +7023,7 @@
                 <a16:creationId xmlns:a16="http://schemas.microsoft.com/office/drawing/2014/main" id="{5F253864-26FA-4AB1-9F0A-4F57D870EE85}"/>
               </a:ext>
               <a:ext uri="{C183D7F6-B498-43B3-948B-1728B52AA6E4}">
-                <adec:decorative xmlns="" xmlns:adec="http://schemas.microsoft.com/office/drawing/2017/decorative" val="1"/>
+                <adec:decorative xmlns:adec="http://schemas.microsoft.com/office/drawing/2017/decorative" xmlns="" val="1"/>
               </a:ext>
             </a:extLst>
           </p:cNvPr>
@@ -7428,13 +7199,27 @@
         </p:spPr>
         <p:txBody>
           <a:bodyPr>
-            <a:normAutofit/>
+            <a:normAutofit fontScale="92500"/>
           </a:bodyPr>
           <a:lstStyle/>
           <a:p>
             <a:r>
               <a:rPr lang="en-US" sz="2800" dirty="0" smtClean="0"/>
-              <a:t>An exception in Java is an error situation which breaks the normal execution flow of a program. In order to handle such exceptions, Java provides a handy mechanism referred to as exception handling.</a:t>
+              <a:t>An exception in Java is an unexpected situation which breaks the normal execution flow of a program. In order to handle such exceptions, Java provides a handy mechanism referred to as exception handling.</a:t>
+            </a:r>
+          </a:p>
+          <a:p>
+            <a:r>
+              <a:rPr lang="en-US" sz="2800" dirty="0" smtClean="0"/>
+              <a:t>Since these situations </a:t>
+            </a:r>
+            <a:r>
+              <a:rPr lang="en-US" sz="2800" dirty="0" smtClean="0"/>
+              <a:t>occur during </a:t>
+            </a:r>
+            <a:r>
+              <a:rPr lang="en-US" sz="2800" dirty="0" smtClean="0"/>
+              <a:t>the normal course of a program hence we call them as “Exception”.</a:t>
             </a:r>
           </a:p>
           <a:p>
@@ -7447,27 +7232,22 @@
             <a:pPr lvl="1"/>
             <a:r>
               <a:rPr lang="en-US" sz="2600" dirty="0" smtClean="0"/>
-              <a:t>Array index out of bounds.</a:t>
+              <a:t>Array index out of range.</a:t>
             </a:r>
           </a:p>
           <a:p>
             <a:pPr lvl="1"/>
             <a:r>
               <a:rPr lang="en-US" sz="2600" dirty="0" smtClean="0"/>
-              <a:t>Trying to access an object through reference when the reference points to null</a:t>
+              <a:t>Trying to access a field of an object through a reference when the reference points to null.</a:t>
             </a:r>
           </a:p>
           <a:p>
             <a:pPr lvl="1"/>
             <a:r>
               <a:rPr lang="en-US" sz="2600" dirty="0" smtClean="0"/>
-              <a:t>Trying to access a file that is not physically present</a:t>
-            </a:r>
-            <a:r>
-              <a:rPr lang="en-US" sz="2600" dirty="0" smtClean="0"/>
-              <a:t>.</a:t>
-            </a:r>
-            <a:endParaRPr lang="en-US" sz="2600" dirty="0" smtClean="0"/>
+              <a:t>Trying to access a file that is not physically present in the location specified.</a:t>
+            </a:r>
           </a:p>
         </p:txBody>
       </p:sp>
@@ -7518,7 +7298,7 @@
                 <a16:creationId xmlns:a16="http://schemas.microsoft.com/office/drawing/2014/main" id="{5F253864-26FA-4AB1-9F0A-4F57D870EE85}"/>
               </a:ext>
               <a:ext uri="{C183D7F6-B498-43B3-948B-1728B52AA6E4}">
-                <adec:decorative xmlns="" xmlns:adec="http://schemas.microsoft.com/office/drawing/2017/decorative" val="1"/>
+                <adec:decorative xmlns:adec="http://schemas.microsoft.com/office/drawing/2017/decorative" xmlns="" val="1"/>
               </a:ext>
             </a:extLst>
           </p:cNvPr>
@@ -7670,17 +7450,33 @@
           <a:p>
             <a:r>
               <a:rPr lang="en-US" sz="2800" dirty="0" smtClean="0"/>
-              <a:t>At any point there are many threads executing inside </a:t>
-            </a:r>
+              <a:t>At any point there are many threads executing inside the JVM. Each thread has its own call stack. Each record on the stack represents a method call. So the record/frame at the top is one that is active and being executed.</a:t>
+            </a:r>
+          </a:p>
+          <a:p>
             <a:r>
               <a:rPr lang="en-US" sz="2800" dirty="0" smtClean="0"/>
-              <a:t>the JVM. Each thread has its own call stack. Each record on the stack represents a method call. So the record/frame at the top is one that is active and being executed.</a:t>
-            </a:r>
-          </a:p>
-          <a:p>
+              <a:t>Each time a new method call is made a new stack frame is </a:t>
+            </a:r>
             <a:r>
               <a:rPr lang="en-US" sz="2800" dirty="0" smtClean="0"/>
-              <a:t>Each time a new method call is made a new stack frame is created on the top of stack and a record corresponding the current method call is pushed onto this frame. Whenever a method call finishes its stack frame is popped off from the stack. This entire stack of any thread is referred to as its Stack Trace.</a:t>
+              <a:t>and a </a:t>
+            </a:r>
+            <a:r>
+              <a:rPr lang="en-US" sz="2800" dirty="0" smtClean="0"/>
+              <a:t>record </a:t>
+            </a:r>
+            <a:r>
+              <a:rPr lang="en-US" sz="2800" dirty="0" smtClean="0"/>
+              <a:t>corresponding </a:t>
+            </a:r>
+            <a:r>
+              <a:rPr lang="en-US" sz="2800" dirty="0" smtClean="0"/>
+              <a:t>to the </a:t>
+            </a:r>
+            <a:r>
+              <a:rPr lang="en-US" sz="2800" dirty="0" smtClean="0"/>
+              <a:t>current method call is pushed onto this frame. Whenever a method call finishes its stack frame is popped off from the stack. This entire stack of any thread is referred to as its Stack Trace.</a:t>
             </a:r>
             <a:endParaRPr lang="en-US" sz="2600" dirty="0" smtClean="0"/>
           </a:p>
@@ -7733,7 +7529,7 @@
                 <a16:creationId xmlns:a16="http://schemas.microsoft.com/office/drawing/2014/main" id="{5F253864-26FA-4AB1-9F0A-4F57D870EE85}"/>
               </a:ext>
               <a:ext uri="{C183D7F6-B498-43B3-948B-1728B52AA6E4}">
-                <adec:decorative xmlns="" xmlns:adec="http://schemas.microsoft.com/office/drawing/2017/decorative" val="1"/>
+                <adec:decorative xmlns:adec="http://schemas.microsoft.com/office/drawing/2017/decorative" xmlns="" val="1"/>
               </a:ext>
             </a:extLst>
           </p:cNvPr>
@@ -7897,7 +7693,23 @@
           <a:p>
             <a:r>
               <a:rPr lang="en-US" sz="2800" dirty="0" smtClean="0"/>
-              <a:t>The exception can be caught at the point where it is raised or it can be propagated down the stack trace all the was to the first method call. If no piece of code handles the exception all the way down the full stack trace then JVM acts as the </a:t>
+              <a:t>The exception can be caught at the point where it is raised or it can be propagated down the stack trace all the </a:t>
+            </a:r>
+            <a:r>
+              <a:rPr lang="en-US" sz="2800" dirty="0" smtClean="0"/>
+              <a:t>way </a:t>
+            </a:r>
+            <a:r>
+              <a:rPr lang="en-US" sz="2800" dirty="0" smtClean="0"/>
+              <a:t>to the first method call. If no piece of code handles the exception all the way down the full stack </a:t>
+            </a:r>
+            <a:r>
+              <a:rPr lang="en-US" sz="2800" dirty="0" smtClean="0"/>
+              <a:t>then </a:t>
+            </a:r>
+            <a:r>
+              <a:rPr lang="en-US" sz="2800" dirty="0" smtClean="0"/>
+              <a:t>JVM acts as the </a:t>
             </a:r>
             <a:r>
               <a:rPr lang="en-US" sz="2800" b="1" i="1" u="sng" dirty="0" smtClean="0"/>
@@ -7909,21 +7721,8 @@
             </a:r>
             <a:r>
               <a:rPr lang="en-US" sz="2800" dirty="0"/>
-              <a:t>.</a:t>
-            </a:r>
-            <a:r>
-              <a:rPr lang="en-US" sz="2800" dirty="0"/>
-              <a:t> An uncaught exception results in the </a:t>
-            </a:r>
-            <a:r>
-              <a:rPr lang="en-US" sz="2800" dirty="0"/>
-              <a:t>death of </a:t>
-            </a:r>
-            <a:r>
-              <a:rPr lang="en-US" sz="2800" dirty="0"/>
-              <a:t>the thread in which the exception occurred.</a:t>
-            </a:r>
-            <a:endParaRPr lang="en-US" sz="2800" dirty="0"/>
+              <a:t>. An uncaught exception results in the death of the thread in which the exception occurred.</a:t>
+            </a:r>
           </a:p>
           <a:p>
             <a:r>
@@ -7991,7 +7790,7 @@
                 <a16:creationId xmlns:a16="http://schemas.microsoft.com/office/drawing/2014/main" id="{5F253864-26FA-4AB1-9F0A-4F57D870EE85}"/>
               </a:ext>
               <a:ext uri="{C183D7F6-B498-43B3-948B-1728B52AA6E4}">
-                <adec:decorative xmlns="" xmlns:adec="http://schemas.microsoft.com/office/drawing/2017/decorative" val="1"/>
+                <adec:decorative xmlns:adec="http://schemas.microsoft.com/office/drawing/2017/decorative" xmlns="" val="1"/>
               </a:ext>
             </a:extLst>
           </p:cNvPr>
@@ -8104,10 +7903,7 @@
           <a:bodyPr/>
           <a:lstStyle/>
           <a:p>
-            <a:r>
-              <a:rPr lang="en-US" dirty="0" smtClean="0"/>
-              <a:t>                             </a:t>
-            </a:r>
+            <a:pPr algn="ctr"/>
             <a:r>
               <a:rPr lang="en-US" dirty="0"/>
               <a:t>Exception Hierarchy</a:t>
@@ -8132,104 +7928,108 @@
             <p:ph idx="1"/>
           </p:nvPr>
         </p:nvSpPr>
-        <p:spPr/>
+        <p:spPr>
+          <a:xfrm>
+            <a:off x="838199" y="1825625"/>
+            <a:ext cx="6689437" cy="4351338"/>
+          </a:xfrm>
+        </p:spPr>
         <p:txBody>
           <a:bodyPr>
-            <a:normAutofit/>
+            <a:normAutofit fontScale="92500" lnSpcReduction="20000"/>
           </a:bodyPr>
           <a:lstStyle/>
           <a:p>
             <a:r>
               <a:rPr lang="en-US" dirty="0" smtClean="0"/>
-              <a:t>All exceptions in java are objects. </a:t>
-            </a:r>
+              <a:t>When an exception is raised, actually an object denoting the concerned exception is created.</a:t>
+            </a:r>
+            <a:endParaRPr lang="en-US" dirty="0" smtClean="0"/>
           </a:p>
           <a:p>
             <a:r>
               <a:rPr lang="en-US" dirty="0" smtClean="0"/>
-              <a:t>There are two types of exceptions in java </a:t>
+              <a:t>An exception object wraps inside of it a message denoting the root cause of exception. Along with thi</a:t>
+            </a:r>
+            <a:r>
+              <a:rPr lang="en-US" dirty="0" smtClean="0"/>
+              <a:t>s it also contains the </a:t>
+            </a:r>
+            <a:r>
+              <a:rPr lang="en-US" dirty="0" err="1" smtClean="0"/>
+              <a:t>Stacktrace</a:t>
+            </a:r>
+            <a:r>
+              <a:rPr lang="en-US" dirty="0" smtClean="0"/>
+              <a:t> of the method that raised  the exception.</a:t>
+            </a:r>
+            <a:endParaRPr lang="en-US" dirty="0" smtClean="0"/>
+          </a:p>
+          <a:p>
+            <a:r>
+              <a:rPr lang="en-US" dirty="0" err="1" smtClean="0"/>
+              <a:t>Throwable</a:t>
+            </a:r>
+            <a:r>
+              <a:rPr lang="en-US" dirty="0" smtClean="0"/>
+              <a:t> </a:t>
+            </a:r>
+            <a:r>
+              <a:rPr lang="en-US" dirty="0" smtClean="0"/>
+              <a:t>interface is the root of the entire </a:t>
+            </a:r>
+            <a:r>
+              <a:rPr lang="en-US" dirty="0" smtClean="0"/>
+              <a:t>exception class </a:t>
+            </a:r>
+            <a:r>
+              <a:rPr lang="en-US" dirty="0" smtClean="0"/>
+              <a:t>hierarchy.</a:t>
+            </a:r>
+          </a:p>
+          <a:p>
+            <a:r>
+              <a:rPr lang="en-US" dirty="0" smtClean="0"/>
+              <a:t>Errors are the situations which cannot be recovered. Hence most probably the only option in such cases is too abort the program execution. Some examples are : </a:t>
             </a:r>
           </a:p>
           <a:p>
             <a:pPr lvl="1"/>
             <a:r>
+              <a:rPr lang="en-US" dirty="0" err="1" smtClean="0"/>
+              <a:t>StackOverFlowError</a:t>
+            </a:r>
+            <a:endParaRPr lang="en-US" dirty="0" smtClean="0"/>
+          </a:p>
+          <a:p>
+            <a:pPr lvl="1"/>
+            <a:r>
+              <a:rPr lang="en-US" dirty="0" err="1" smtClean="0"/>
+              <a:t>OutOfMemoryError</a:t>
+            </a:r>
+            <a:endParaRPr lang="en-US" dirty="0" smtClean="0"/>
+          </a:p>
+          <a:p>
+            <a:r>
+              <a:rPr lang="en-US" dirty="0" err="1" smtClean="0"/>
+              <a:t>RuntimeException</a:t>
+            </a:r>
+            <a:r>
               <a:rPr lang="en-US" dirty="0" smtClean="0"/>
-              <a:t>In-build Exception classes.</a:t>
-            </a:r>
-          </a:p>
-          <a:p>
-            <a:pPr lvl="2"/>
+              <a:t> are those classes which denote those class of exception that may occur at runtime and that are mostly caused by programming errors.</a:t>
+            </a:r>
+          </a:p>
+          <a:p>
             <a:r>
               <a:rPr lang="en-US" dirty="0" smtClean="0"/>
-              <a:t>These are the exception classes provided by the JDK </a:t>
-            </a:r>
-            <a:r>
-              <a:rPr lang="en-US" dirty="0" err="1"/>
-              <a:t>a</a:t>
-            </a:r>
-            <a:r>
-              <a:rPr lang="en-US" dirty="0" err="1" smtClean="0"/>
-              <a:t>pi</a:t>
-            </a:r>
-            <a:r>
-              <a:rPr lang="en-US" dirty="0" smtClean="0"/>
-              <a:t>.</a:t>
-            </a:r>
-          </a:p>
-          <a:p>
-            <a:pPr lvl="1"/>
-            <a:r>
-              <a:rPr lang="en-US" dirty="0" smtClean="0"/>
-              <a:t>User-defined exception.</a:t>
-            </a:r>
-          </a:p>
-          <a:p>
-            <a:pPr lvl="2"/>
-            <a:r>
-              <a:rPr lang="en-US" dirty="0" smtClean="0"/>
-              <a:t>These are the user defined exceptions.</a:t>
-            </a:r>
-          </a:p>
-          <a:p>
-            <a:r>
-              <a:rPr lang="en-US" noProof="1" smtClean="0"/>
-              <a:t>Each in-built jdk exception class handles a certain type of unexpected situation.</a:t>
-            </a:r>
-            <a:br>
-              <a:rPr lang="en-US" noProof="1" smtClean="0"/>
-            </a:br>
-            <a:r>
-              <a:rPr lang="en-US" noProof="1" smtClean="0"/>
-              <a:t>Some examples of exception are : </a:t>
-            </a:r>
-          </a:p>
-          <a:p>
-            <a:pPr lvl="1"/>
-            <a:r>
-              <a:rPr lang="en-US" noProof="1" smtClean="0"/>
-              <a:t>NullPointerException</a:t>
-            </a:r>
-          </a:p>
-          <a:p>
-            <a:pPr lvl="1"/>
-            <a:r>
-              <a:rPr lang="en-US" noProof="1" smtClean="0"/>
-              <a:t>ClassNotFoundException</a:t>
-            </a:r>
-          </a:p>
-          <a:p>
-            <a:pPr lvl="1"/>
-            <a:r>
-              <a:rPr lang="en-US" noProof="1" smtClean="0"/>
-              <a:t>ArrayIndexOutOfBoundException</a:t>
-            </a:r>
-          </a:p>
-          <a:p>
-            <a:pPr lvl="1"/>
-            <a:r>
-              <a:rPr lang="en-US" noProof="1" smtClean="0"/>
-              <a:t>FileNotFoundException</a:t>
-            </a:r>
+              <a:t>All other exceptions lie under Exception class hierarchy.</a:t>
+            </a:r>
+          </a:p>
+          <a:p>
+            <a:endParaRPr lang="en-US" dirty="0" smtClean="0"/>
+          </a:p>
+          <a:p>
+            <a:endParaRPr lang="en-US" noProof="1" smtClean="0"/>
           </a:p>
           <a:p>
             <a:endParaRPr lang="en-US" noProof="1"/>
@@ -8283,7 +8083,7 @@
                 <a16:creationId xmlns:a16="http://schemas.microsoft.com/office/drawing/2014/main" id="{5F253864-26FA-4AB1-9F0A-4F57D870EE85}"/>
               </a:ext>
               <a:ext uri="{C183D7F6-B498-43B3-948B-1728B52AA6E4}">
-                <adec:decorative xmlns="" xmlns:adec="http://schemas.microsoft.com/office/drawing/2017/decorative" val="1"/>
+                <adec:decorative xmlns:adec="http://schemas.microsoft.com/office/drawing/2017/decorative" xmlns="" val="1"/>
               </a:ext>
             </a:extLst>
           </p:cNvPr>
@@ -8335,7 +8135,7 @@
       </p:sp>
       <p:pic>
         <p:nvPicPr>
-          <p:cNvPr id="2058" name="Picture 10" descr="Java - Exceptions - Tutorialspoint"/>
+          <p:cNvPr id="8" name="Picture 10" descr="Java - Exceptions - Tutorialspoint"/>
           <p:cNvPicPr>
             <a:picLocks noChangeAspect="1" noChangeArrowheads="1"/>
           </p:cNvPicPr>
@@ -8356,8 +8156,8 @@
         </p:blipFill>
         <p:spPr bwMode="auto">
           <a:xfrm>
-            <a:off x="7001163" y="1978891"/>
-            <a:ext cx="4352635" cy="4198072"/>
+            <a:off x="7924800" y="1978891"/>
+            <a:ext cx="3428998" cy="4198072"/>
           </a:xfrm>
           <a:prstGeom prst="rect">
             <a:avLst/>
@@ -8377,7 +8177,7 @@
     </p:spTree>
     <p:extLst>
       <p:ext uri="{BB962C8B-B14F-4D97-AF65-F5344CB8AC3E}">
-        <p14:creationId xmlns:p14="http://schemas.microsoft.com/office/powerpoint/2010/main" val="859118885"/>
+        <p14:creationId xmlns:p14="http://schemas.microsoft.com/office/powerpoint/2010/main" val="2081229395"/>
       </p:ext>
     </p:extLst>
   </p:cSld>
@@ -8440,7 +8240,7 @@
             <a:pPr algn="ctr"/>
             <a:r>
               <a:rPr lang="en-US" dirty="0" smtClean="0"/>
-              <a:t>Try-Catch Block</a:t>
+              <a:t>Try-Catch or Throws Choice</a:t>
             </a:r>
             <a:endParaRPr lang="en-US" dirty="0"/>
           </a:p>
@@ -8470,69 +8270,42 @@
         </p:spPr>
         <p:txBody>
           <a:bodyPr>
-            <a:normAutofit lnSpcReduction="10000"/>
+            <a:normAutofit fontScale="70000" lnSpcReduction="20000"/>
           </a:bodyPr>
           <a:lstStyle/>
           <a:p>
             <a:r>
               <a:rPr lang="en-US" sz="2800" dirty="0" smtClean="0"/>
-              <a:t>A try-catch block in Java is used to handle exceptions while program execution.</a:t>
-            </a:r>
-          </a:p>
-          <a:p>
+              <a:t>In general when writing it is a common scenario that there are components or modules and then there are users of that module. Developer of the module generally specifies the input parameters for the module and return type. Apart from this if he thinks that he cannot handle a specific exception that occurs during the module execution then he can choose to delegate that exception to the user/caller of that module. </a:t>
+            </a:r>
             <a:r>
               <a:rPr lang="en-US" sz="2800" dirty="0" smtClean="0"/>
-              <a:t>All suspecting code that is capable of raising an exception is placed inside of the try{} block. When </a:t>
-            </a:r>
-            <a:r>
-              <a:rPr lang="en-US" sz="2800" dirty="0"/>
-              <a:t>executing a</a:t>
-            </a:r>
+              <a:t>This is referred to as module “throws” the exception to its caller.</a:t>
+            </a:r>
+          </a:p>
+          <a:p>
             <a:r>
               <a:rPr lang="en-US" sz="2800" dirty="0" smtClean="0"/>
-              <a:t> </a:t>
-            </a:r>
-            <a:r>
-              <a:rPr lang="en-US" sz="2800" dirty="0"/>
-              <a:t>code block inside </a:t>
-            </a:r>
+              <a:t>On the other hand caller of the module chooses to handle the exception locally, he can put the exception raising module usage in the try block and correspondingly put a “catch” block containing the code to successfully recover from the exception</a:t>
+            </a:r>
+          </a:p>
+          <a:p>
             <a:r>
               <a:rPr lang="en-US" sz="2800" dirty="0" smtClean="0"/>
-              <a:t>of</a:t>
-            </a:r>
+              <a:t>Alternatively the caller could also decide to delegate the exception further up the call hierarchy. In this case he could also say to its calling component that the code “throws” an exception.</a:t>
+            </a:r>
+          </a:p>
+          <a:p>
             <a:r>
               <a:rPr lang="en-US" sz="2800" dirty="0" smtClean="0"/>
-              <a:t> try </a:t>
-            </a:r>
+              <a:t>So conclusively there are two things every programmer can do about exceptions. Either to handle it locally using the try-catch block or “throws” the exception to its calling component.</a:t>
+            </a:r>
+          </a:p>
+          <a:p>
             <a:r>
               <a:rPr lang="en-US" sz="2800" dirty="0" smtClean="0"/>
-              <a:t>block</a:t>
-            </a:r>
-            <a:r>
-              <a:rPr lang="en-US" sz="2800" dirty="0" smtClean="0"/>
-              <a:t>, an </a:t>
-            </a:r>
-            <a:r>
-              <a:rPr lang="en-US" sz="2800" dirty="0" smtClean="0"/>
-              <a:t>exception  occurs , then rather inappropriate program termination and message printing, the program is given an opportunity to recover from exception by catching the exception in the </a:t>
-            </a:r>
-            <a:r>
-              <a:rPr lang="en-US" sz="2800" dirty="0" smtClean="0"/>
-              <a:t>catch</a:t>
-            </a:r>
-            <a:r>
-              <a:rPr lang="en-US" sz="2800" dirty="0" smtClean="0"/>
-              <a:t> block.</a:t>
-            </a:r>
-          </a:p>
-          <a:p>
-            <a:r>
-              <a:rPr lang="en-US" sz="2800" dirty="0"/>
-              <a:t>Java provides a try-catch-finally mechanism to fully handle most of the exceptions that are raised .</a:t>
-            </a:r>
-            <a:br>
-              <a:rPr lang="en-US" sz="2800" dirty="0"/>
-            </a:br>
+              <a:t>Using the “throws” way, if the exception keeps getting propagated down stack trace and ultimately if no code handles it then, JVM becomes the default handler and throws it out to the end user with the appropriate message and full stack trace down to the point where exception occurred.</a:t>
+            </a:r>
             <a:endParaRPr lang="en-US" sz="2800" dirty="0"/>
           </a:p>
         </p:txBody>
@@ -8584,7 +8357,7 @@
                 <a16:creationId xmlns:a16="http://schemas.microsoft.com/office/drawing/2014/main" id="{5F253864-26FA-4AB1-9F0A-4F57D870EE85}"/>
               </a:ext>
               <a:ext uri="{C183D7F6-B498-43B3-948B-1728B52AA6E4}">
-                <adec:decorative xmlns="" xmlns:adec="http://schemas.microsoft.com/office/drawing/2017/decorative" val="1"/>
+                <adec:decorative xmlns:adec="http://schemas.microsoft.com/office/drawing/2017/decorative" xmlns="" val="1"/>
               </a:ext>
             </a:extLst>
           </p:cNvPr>
@@ -8637,7 +8410,7 @@
     </p:spTree>
     <p:extLst>
       <p:ext uri="{BB962C8B-B14F-4D97-AF65-F5344CB8AC3E}">
-        <p14:creationId xmlns:p14="http://schemas.microsoft.com/office/powerpoint/2010/main" val="2745771103"/>
+        <p14:creationId xmlns:p14="http://schemas.microsoft.com/office/powerpoint/2010/main" val="570373965"/>
       </p:ext>
     </p:extLst>
   </p:cSld>
@@ -8700,7 +8473,7 @@
             <a:pPr algn="ctr"/>
             <a:r>
               <a:rPr lang="en-US" dirty="0" smtClean="0"/>
-              <a:t>Method Parameters</a:t>
+              <a:t>Try-Catch block</a:t>
             </a:r>
             <a:endParaRPr lang="en-US" dirty="0"/>
           </a:p>
@@ -8730,34 +8503,38 @@
         </p:spPr>
         <p:txBody>
           <a:bodyPr>
-            <a:normAutofit/>
+            <a:normAutofit fontScale="92500" lnSpcReduction="20000"/>
           </a:bodyPr>
           <a:lstStyle/>
           <a:p>
-            <a:endParaRPr lang="en-US" sz="2800" dirty="0" smtClean="0"/>
-          </a:p>
-          <a:p>
-            <a:endParaRPr lang="en-US" sz="2800" dirty="0"/>
-          </a:p>
-          <a:p>
             <a:r>
               <a:rPr lang="en-US" sz="2800" dirty="0" smtClean="0"/>
-              <a:t>A method can be passed zero or more input parameters.</a:t>
+              <a:t>A try block is the one which contains all the code that could potentially lead to an exception.</a:t>
             </a:r>
           </a:p>
           <a:p>
             <a:r>
               <a:rPr lang="en-US" sz="2800" dirty="0" smtClean="0"/>
-              <a:t>The rules applying to method return types are also applicable to the method parameters.</a:t>
+              <a:t>The try block can be followed by one or more catch blocks. Order of catch blocks is important.</a:t>
             </a:r>
           </a:p>
           <a:p>
             <a:r>
               <a:rPr lang="en-US" sz="2800" dirty="0" smtClean="0"/>
-              <a:t>Method parameters can also be defined as variable arguments. This means there is a choice with the method caller , he can choose pass in one , two , three or even no parameters.</a:t>
-            </a:r>
-          </a:p>
-          <a:p>
+              <a:t>Multiple catch blocks should be written in such a way that exception classes lower in the hierarchy should appear first while the higher one should come later.</a:t>
+            </a:r>
+          </a:p>
+          <a:p>
+            <a:r>
+              <a:rPr lang="en-US" sz="2800" dirty="0" smtClean="0"/>
+              <a:t>If we try to put an exception class higher in the hierarchy above the class which is lower in the hierarchy then the catch block containing the lower exception class becomes unreachable.</a:t>
+            </a:r>
+          </a:p>
+          <a:p>
+            <a:r>
+              <a:rPr lang="en-US" sz="2800" dirty="0" smtClean="0"/>
+              <a:t>Since a parent class present in a higher catch block hence lower catch blocks would never be able to catch an exception.</a:t>
+            </a:r>
             <a:endParaRPr lang="en-US" sz="2800" dirty="0"/>
           </a:p>
         </p:txBody>
@@ -8809,7 +8586,7 @@
                 <a16:creationId xmlns:a16="http://schemas.microsoft.com/office/drawing/2014/main" id="{5F253864-26FA-4AB1-9F0A-4F57D870EE85}"/>
               </a:ext>
               <a:ext uri="{C183D7F6-B498-43B3-948B-1728B52AA6E4}">
-                <adec:decorative xmlns="" xmlns:adec="http://schemas.microsoft.com/office/drawing/2017/decorative" val="1"/>
+                <adec:decorative xmlns:adec="http://schemas.microsoft.com/office/drawing/2017/decorative" xmlns="" val="1"/>
               </a:ext>
             </a:extLst>
           </p:cNvPr>
@@ -8862,7 +8639,7 @@
     </p:spTree>
     <p:extLst>
       <p:ext uri="{BB962C8B-B14F-4D97-AF65-F5344CB8AC3E}">
-        <p14:creationId xmlns:p14="http://schemas.microsoft.com/office/powerpoint/2010/main" val="1093716427"/>
+        <p14:creationId xmlns:p14="http://schemas.microsoft.com/office/powerpoint/2010/main" val="1262960452"/>
       </p:ext>
     </p:extLst>
   </p:cSld>
@@ -8925,7 +8702,15 @@
             <a:pPr algn="ctr"/>
             <a:r>
               <a:rPr lang="en-US" dirty="0" smtClean="0"/>
-              <a:t>Variable Arguments</a:t>
+              <a:t>“throw”-</a:t>
+            </a:r>
+            <a:r>
+              <a:rPr lang="en-US" dirty="0" err="1" smtClean="0"/>
+              <a:t>ing</a:t>
+            </a:r>
+            <a:r>
+              <a:rPr lang="en-US" dirty="0" smtClean="0"/>
+              <a:t> Exception</a:t>
             </a:r>
             <a:endParaRPr lang="en-US" dirty="0"/>
           </a:p>
@@ -8955,73 +8740,40 @@
         </p:spPr>
         <p:txBody>
           <a:bodyPr>
-            <a:normAutofit fontScale="92500" lnSpcReduction="20000"/>
+            <a:normAutofit/>
           </a:bodyPr>
           <a:lstStyle/>
           <a:p>
+            <a:endParaRPr lang="en-US" sz="2800" dirty="0" smtClean="0"/>
+          </a:p>
+          <a:p>
             <a:r>
               <a:rPr lang="en-US" sz="2800" dirty="0" smtClean="0"/>
-              <a:t>There might be cases where you know the type of argument the user shall pass but have no idea on how many variables it would be passing. </a:t>
+              <a:t>A programmer also could “throw” an exception. If certain condition in the code that the programmer mandate to be fulfilled is violated and the programmer thinks that further execution is not possible then he can decide to throw an exception explicitly.</a:t>
             </a:r>
           </a:p>
           <a:p>
             <a:r>
               <a:rPr lang="en-US" sz="2800" dirty="0" smtClean="0"/>
-              <a:t>Classic example would be a method that adds numbers. Caller of the add method might want to add two, three, four or more numbers which would be decided at runtime.</a:t>
+              <a:t>Only exception objects can be used with “throw” clause not any other object. Hence following is an example of incorrect throw usage :</a:t>
+            </a:r>
+          </a:p>
+          <a:p>
+            <a:pPr lvl="1"/>
+            <a:r>
+              <a:rPr lang="en-US" sz="2600" dirty="0" smtClean="0"/>
+              <a:t>throw new String(“Java”)</a:t>
             </a:r>
           </a:p>
           <a:p>
             <a:r>
               <a:rPr lang="en-US" sz="2800" dirty="0" smtClean="0"/>
-              <a:t>Java allows passing </a:t>
-            </a:r>
-            <a:r>
-              <a:rPr lang="en-US" sz="2800" dirty="0"/>
-              <a:t>variable arguments to </a:t>
+              <a:t>Only objects whose classes </a:t>
             </a:r>
             <a:r>
               <a:rPr lang="en-US" sz="2800" dirty="0" smtClean="0"/>
-              <a:t>a </a:t>
-            </a:r>
-            <a:r>
-              <a:rPr lang="en-US" sz="2800" dirty="0"/>
-              <a:t>method wherein the number of arguments passed to the method depends upon the </a:t>
-            </a:r>
-            <a:r>
-              <a:rPr lang="en-US" sz="2800" dirty="0" smtClean="0"/>
-              <a:t>caller of the method.</a:t>
-            </a:r>
-            <a:r>
-              <a:rPr lang="en-US" sz="2800" dirty="0"/>
-              <a:t> It is somewhat similar to declaring a method with array as a parameter. At runtime JVM simply bundles all values in an array and passes it on to the method</a:t>
-            </a:r>
-            <a:r>
-              <a:rPr lang="en-US" sz="2800" dirty="0" smtClean="0"/>
-              <a:t>.</a:t>
-            </a:r>
-          </a:p>
-          <a:p>
-            <a:r>
-              <a:rPr lang="en-US" sz="2800" dirty="0" smtClean="0"/>
-              <a:t>Rules of variable arguments : </a:t>
-            </a:r>
-          </a:p>
-          <a:p>
-            <a:pPr lvl="1"/>
-            <a:r>
-              <a:rPr lang="en-US" sz="2600" dirty="0" smtClean="0"/>
-              <a:t>Only one variable argument allowed to be declared as method parameter.</a:t>
-            </a:r>
-          </a:p>
-          <a:p>
-            <a:pPr lvl="1"/>
-            <a:r>
-              <a:rPr lang="en-US" sz="2600" dirty="0" smtClean="0"/>
-              <a:t>Variable argument must be the last to be declared in the parameter list.</a:t>
-            </a:r>
-            <a:endParaRPr lang="en-US" sz="2600" dirty="0"/>
-          </a:p>
-          <a:p>
+              <a:t>lie in the exception hierarchy are eligible to be used with “throw” clause.</a:t>
+            </a:r>
             <a:endParaRPr lang="en-US" sz="2800" dirty="0" smtClean="0"/>
           </a:p>
         </p:txBody>
@@ -9073,7 +8825,7 @@
                 <a16:creationId xmlns:a16="http://schemas.microsoft.com/office/drawing/2014/main" id="{5F253864-26FA-4AB1-9F0A-4F57D870EE85}"/>
               </a:ext>
               <a:ext uri="{C183D7F6-B498-43B3-948B-1728B52AA6E4}">
-                <adec:decorative xmlns="" xmlns:adec="http://schemas.microsoft.com/office/drawing/2017/decorative" val="1"/>
+                <adec:decorative xmlns:adec="http://schemas.microsoft.com/office/drawing/2017/decorative" xmlns="" val="1"/>
               </a:ext>
             </a:extLst>
           </p:cNvPr>
@@ -9126,7 +8878,7 @@
     </p:spTree>
     <p:extLst>
       <p:ext uri="{BB962C8B-B14F-4D97-AF65-F5344CB8AC3E}">
-        <p14:creationId xmlns:p14="http://schemas.microsoft.com/office/powerpoint/2010/main" val="1886034423"/>
+        <p14:creationId xmlns:p14="http://schemas.microsoft.com/office/powerpoint/2010/main" val="65767595"/>
       </p:ext>
     </p:extLst>
   </p:cSld>
@@ -10021,24 +9773,6 @@
 </file>
 
 <file path=customXml/item1.xml><?xml version="1.0" encoding="utf-8"?>
-<?mso-contentType ?>
-<FormTemplates xmlns="http://schemas.microsoft.com/sharepoint/v3/contenttype/forms">
-  <Display>DocumentLibraryForm</Display>
-  <Edit>DocumentLibraryForm</Edit>
-  <New>DocumentLibraryForm</New>
-</FormTemplates>
-</file>
-
-<file path=customXml/item2.xml><?xml version="1.0" encoding="utf-8"?>
-<p:properties xmlns:p="http://schemas.microsoft.com/office/2006/metadata/properties" xmlns:xsi="http://www.w3.org/2001/XMLSchema-instance" xmlns:pc="http://schemas.microsoft.com/office/infopath/2007/PartnerControls">
-  <documentManagement>
-    <Status xmlns="71af3243-3dd4-4a8d-8c0d-dd76da1f02a5">Not started</Status>
-    <MediaServiceKeyPoints xmlns="71af3243-3dd4-4a8d-8c0d-dd76da1f02a5" xsi:nil="true"/>
-  </documentManagement>
-</p:properties>
-</file>
-
-<file path=customXml/item3.xml><?xml version="1.0" encoding="utf-8"?>
 <ct:contentTypeSchema xmlns:ct="http://schemas.microsoft.com/office/2006/metadata/contentType" xmlns:ma="http://schemas.microsoft.com/office/2006/metadata/properties/metaAttributes" ct:_="" ma:_="" ma:contentTypeName="Document" ma:contentTypeID="0x01010079F111ED35F8CC479449609E8A0923A6" ma:contentTypeVersion="12" ma:contentTypeDescription="Create a new document." ma:contentTypeScope="" ma:versionID="fa6e671f1cd7e4d96ff9652be322dd5e">
   <xsd:schema xmlns:xsd="http://www.w3.org/2001/XMLSchema" xmlns:xs="http://www.w3.org/2001/XMLSchema" xmlns:p="http://schemas.microsoft.com/office/2006/metadata/properties" xmlns:ns2="71af3243-3dd4-4a8d-8c0d-dd76da1f02a5" xmlns:ns3="16c05727-aa75-4e4a-9b5f-8a80a1165891" targetNamespace="http://schemas.microsoft.com/office/2006/metadata/properties" ma:root="true" ma:fieldsID="4e2496f70b101db0b8013f30a071bbf7" ns2:_="" ns3:_="">
     <xsd:import namespace="71af3243-3dd4-4a8d-8c0d-dd76da1f02a5"/>
@@ -10259,25 +9993,25 @@
 </ct:contentTypeSchema>
 </file>
 
-<file path=customXml/itemProps1.xml><?xml version="1.0" encoding="utf-8"?>
-<ds:datastoreItem xmlns:ds="http://schemas.openxmlformats.org/officeDocument/2006/customXml" ds:itemID="{EBB7C387-AFDC-4FE3-A658-984B7F35F155}">
-  <ds:schemaRefs>
-    <ds:schemaRef ds:uri="http://schemas.microsoft.com/sharepoint/v3/contenttype/forms"/>
-  </ds:schemaRefs>
-</ds:datastoreItem>
+<file path=customXml/item2.xml><?xml version="1.0" encoding="utf-8"?>
+<p:properties xmlns:p="http://schemas.microsoft.com/office/2006/metadata/properties" xmlns:xsi="http://www.w3.org/2001/XMLSchema-instance" xmlns:pc="http://schemas.microsoft.com/office/infopath/2007/PartnerControls">
+  <documentManagement>
+    <Status xmlns="71af3243-3dd4-4a8d-8c0d-dd76da1f02a5">Not started</Status>
+    <MediaServiceKeyPoints xmlns="71af3243-3dd4-4a8d-8c0d-dd76da1f02a5" xsi:nil="true"/>
+  </documentManagement>
+</p:properties>
 </file>
 
-<file path=customXml/itemProps2.xml><?xml version="1.0" encoding="utf-8"?>
-<ds:datastoreItem xmlns:ds="http://schemas.openxmlformats.org/officeDocument/2006/customXml" ds:itemID="{F4E32C0B-4052-44CB-9341-8AD8B2CC4712}">
-  <ds:schemaRefs>
-    <ds:schemaRef ds:uri="http://schemas.microsoft.com/office/2006/metadata/properties"/>
-    <ds:schemaRef ds:uri="http://schemas.microsoft.com/office/infopath/2007/PartnerControls"/>
-    <ds:schemaRef ds:uri="71af3243-3dd4-4a8d-8c0d-dd76da1f02a5"/>
-  </ds:schemaRefs>
-</ds:datastoreItem>
+<file path=customXml/item3.xml><?xml version="1.0" encoding="utf-8"?>
+<?mso-contentType ?>
+<FormTemplates xmlns="http://schemas.microsoft.com/sharepoint/v3/contenttype/forms">
+  <Display>DocumentLibraryForm</Display>
+  <Edit>DocumentLibraryForm</Edit>
+  <New>DocumentLibraryForm</New>
+</FormTemplates>
 </file>
 
-<file path=customXml/itemProps3.xml><?xml version="1.0" encoding="utf-8"?>
+<file path=customXml/itemProps1.xml><?xml version="1.0" encoding="utf-8"?>
 <ds:datastoreItem xmlns:ds="http://schemas.openxmlformats.org/officeDocument/2006/customXml" ds:itemID="{D6766BD6-F648-49AA-B7EC-13E75CECB99A}">
   <ds:schemaRefs>
     <ds:schemaRef ds:uri="http://schemas.microsoft.com/office/2006/metadata/contentType"/>
@@ -10294,4 +10028,22 @@
     <ds:schemaRef ds:uri="http://schemas.microsoft.com/internal/obd"/>
   </ds:schemaRefs>
 </ds:datastoreItem>
+</file>
+
+<file path=customXml/itemProps2.xml><?xml version="1.0" encoding="utf-8"?>
+<ds:datastoreItem xmlns:ds="http://schemas.openxmlformats.org/officeDocument/2006/customXml" ds:itemID="{F4E32C0B-4052-44CB-9341-8AD8B2CC4712}">
+  <ds:schemaRefs>
+    <ds:schemaRef ds:uri="http://schemas.microsoft.com/office/2006/metadata/properties"/>
+    <ds:schemaRef ds:uri="http://schemas.microsoft.com/office/infopath/2007/PartnerControls"/>
+    <ds:schemaRef ds:uri="71af3243-3dd4-4a8d-8c0d-dd76da1f02a5"/>
+  </ds:schemaRefs>
+</ds:datastoreItem>
+</file>
+
+<file path=customXml/itemProps3.xml><?xml version="1.0" encoding="utf-8"?>
+<ds:datastoreItem xmlns:ds="http://schemas.openxmlformats.org/officeDocument/2006/customXml" ds:itemID="{EBB7C387-AFDC-4FE3-A658-984B7F35F155}">
+  <ds:schemaRefs>
+    <ds:schemaRef ds:uri="http://schemas.microsoft.com/sharepoint/v3/contenttype/forms"/>
+  </ds:schemaRefs>
+</ds:datastoreItem>
 </file>
</xml_diff>